<commit_message>
Updated PPT containing results of Adaptive TD(lambda) with graphs on lambda dist. by state and evolution over time
</commit_message>
<xml_diff>
--- a/RL-001-MemoryManagement/results/202005May20-TestsTDLambda&AdaptiveTDLambda-1DGridworld.pptx
+++ b/RL-001-MemoryManagement/results/202005May20-TestsTDLambda&AdaptiveTDLambda-1DGridworld.pptx
@@ -5,7 +5,7 @@
     <p:sldMasterId id="2147483648" r:id="rId1"/>
   </p:sldMasterIdLst>
   <p:notesMasterIdLst>
-    <p:notesMasterId r:id="rId25"/>
+    <p:notesMasterId r:id="rId31"/>
   </p:notesMasterIdLst>
   <p:sldIdLst>
     <p:sldId id="264" r:id="rId2"/>
@@ -30,7 +30,13 @@
     <p:sldId id="299" r:id="rId21"/>
     <p:sldId id="300" r:id="rId22"/>
     <p:sldId id="294" r:id="rId23"/>
-    <p:sldId id="289" r:id="rId24"/>
+    <p:sldId id="301" r:id="rId24"/>
+    <p:sldId id="302" r:id="rId25"/>
+    <p:sldId id="303" r:id="rId26"/>
+    <p:sldId id="304" r:id="rId27"/>
+    <p:sldId id="306" r:id="rId28"/>
+    <p:sldId id="305" r:id="rId29"/>
+    <p:sldId id="307" r:id="rId30"/>
   </p:sldIdLst>
   <p:sldSz cx="9144000" cy="6858000" type="screen4x3"/>
   <p:notesSz cx="6858000" cy="9144000"/>
@@ -214,7 +220,7 @@
           <a:p>
             <a:fld id="{20C8C433-DA52-491B-A73E-C12FDEDAADD7}" type="datetimeFigureOut">
               <a:rPr lang="en-US" smtClean="0"/>
-              <a:t>5/25/2020</a:t>
+              <a:t>5/27/2020</a:t>
             </a:fld>
             <a:endParaRPr lang="en-US"/>
           </a:p>
@@ -663,7 +669,7 @@
           <a:p>
             <a:fld id="{0DE82379-504A-4D22-912F-5AD071F65510}" type="datetime1">
               <a:rPr lang="en-US" smtClean="0"/>
-              <a:t>5/25/2020</a:t>
+              <a:t>5/27/2020</a:t>
             </a:fld>
             <a:endParaRPr lang="en-US"/>
           </a:p>
@@ -833,7 +839,7 @@
           <a:p>
             <a:fld id="{0A308B76-0F46-4867-A704-020E0510BAB9}" type="datetime1">
               <a:rPr lang="en-US" smtClean="0"/>
-              <a:t>5/25/2020</a:t>
+              <a:t>5/27/2020</a:t>
             </a:fld>
             <a:endParaRPr lang="en-US"/>
           </a:p>
@@ -1013,7 +1019,7 @@
           <a:p>
             <a:fld id="{9EFF22E2-E7CD-4BE6-BC79-8DA58B78DFB6}" type="datetime1">
               <a:rPr lang="en-US" smtClean="0"/>
-              <a:t>5/25/2020</a:t>
+              <a:t>5/27/2020</a:t>
             </a:fld>
             <a:endParaRPr lang="en-US"/>
           </a:p>
@@ -1188,7 +1194,7 @@
           <a:p>
             <a:fld id="{6CA885D4-6B25-42CC-AB85-BE2955A0365B}" type="datetime1">
               <a:rPr lang="en-US" smtClean="0"/>
-              <a:t>5/25/2020</a:t>
+              <a:t>5/27/2020</a:t>
             </a:fld>
             <a:endParaRPr lang="en-US"/>
           </a:p>
@@ -1434,7 +1440,7 @@
           <a:p>
             <a:fld id="{80351717-A3AD-4C3A-BE51-731713DEEB71}" type="datetime1">
               <a:rPr lang="en-US" smtClean="0"/>
-              <a:t>5/25/2020</a:t>
+              <a:t>5/27/2020</a:t>
             </a:fld>
             <a:endParaRPr lang="en-US"/>
           </a:p>
@@ -1722,7 +1728,7 @@
           <a:p>
             <a:fld id="{62BCE9C6-0B67-4DEA-90FE-A224EA57A00A}" type="datetime1">
               <a:rPr lang="en-US" smtClean="0"/>
-              <a:t>5/25/2020</a:t>
+              <a:t>5/27/2020</a:t>
             </a:fld>
             <a:endParaRPr lang="en-US"/>
           </a:p>
@@ -2144,7 +2150,7 @@
           <a:p>
             <a:fld id="{8D602F8B-96AF-427F-AFB0-5AA790D1A556}" type="datetime1">
               <a:rPr lang="en-US" smtClean="0"/>
-              <a:t>5/25/2020</a:t>
+              <a:t>5/27/2020</a:t>
             </a:fld>
             <a:endParaRPr lang="en-US"/>
           </a:p>
@@ -2262,7 +2268,7 @@
           <a:p>
             <a:fld id="{DE59CFD8-766C-49D0-8B25-5E5802F68280}" type="datetime1">
               <a:rPr lang="en-US" smtClean="0"/>
-              <a:t>5/25/2020</a:t>
+              <a:t>5/27/2020</a:t>
             </a:fld>
             <a:endParaRPr lang="en-US"/>
           </a:p>
@@ -2357,7 +2363,7 @@
           <a:p>
             <a:fld id="{CF61C585-8DA1-4E43-85B1-8A0CE4C96C73}" type="datetime1">
               <a:rPr lang="en-US" smtClean="0"/>
-              <a:t>5/25/2020</a:t>
+              <a:t>5/27/2020</a:t>
             </a:fld>
             <a:endParaRPr lang="en-US"/>
           </a:p>
@@ -2634,7 +2640,7 @@
           <a:p>
             <a:fld id="{8DBCACC1-07A6-4180-8A86-AE9BA3E8681E}" type="datetime1">
               <a:rPr lang="en-US" smtClean="0"/>
-              <a:t>5/25/2020</a:t>
+              <a:t>5/27/2020</a:t>
             </a:fld>
             <a:endParaRPr lang="en-US"/>
           </a:p>
@@ -2887,7 +2893,7 @@
           <a:p>
             <a:fld id="{E2B91FF2-4C13-4DE6-856A-67C242DD3908}" type="datetime1">
               <a:rPr lang="en-US" smtClean="0"/>
-              <a:t>5/25/2020</a:t>
+              <a:t>5/27/2020</a:t>
             </a:fld>
             <a:endParaRPr lang="en-US"/>
           </a:p>
@@ -3100,7 +3106,7 @@
           <a:p>
             <a:fld id="{88B6596B-24FF-458E-ADAE-08D8D099933C}" type="datetime1">
               <a:rPr lang="en-US" smtClean="0"/>
-              <a:t>5/25/2020</a:t>
+              <a:t>5/27/2020</a:t>
             </a:fld>
             <a:endParaRPr lang="en-US"/>
           </a:p>
@@ -3552,15 +3558,7 @@
                   <a:schemeClr val="tx1"/>
                 </a:solidFill>
               </a:rPr>
-              <a:t>Wed, </a:t>
-            </a:r>
-            <a:r>
-              <a:rPr lang="en-US" sz="2000" dirty="0" smtClean="0">
-                <a:solidFill>
-                  <a:schemeClr val="tx1"/>
-                </a:solidFill>
-              </a:rPr>
-              <a:t>20-May-2020</a:t>
+              <a:t>Wed, 20-May-2020</a:t>
             </a:r>
           </a:p>
           <a:p>
@@ -3572,11 +3570,6 @@
               </a:rPr>
               <a:t>Updated: Mon, 25-May-2020</a:t>
             </a:r>
-            <a:endParaRPr lang="en-US" sz="2000" b="1" i="1" dirty="0" smtClean="0">
-              <a:solidFill>
-                <a:schemeClr val="tx1"/>
-              </a:solidFill>
-            </a:endParaRPr>
           </a:p>
           <a:p>
             <a:r>
@@ -3941,13 +3934,7 @@
               <a:rPr lang="en-US" sz="3600" dirty="0" smtClean="0">
                 <a:sym typeface="Symbol"/>
               </a:rPr>
-              <a:t>adaptive </a:t>
-            </a:r>
-            <a:r>
-              <a:rPr lang="en-US" sz="3600" dirty="0" smtClean="0">
-                <a:sym typeface="Symbol"/>
-              </a:rPr>
-              <a:t> </a:t>
+              <a:t>adaptive  </a:t>
             </a:r>
             <a:r>
               <a:rPr lang="en-US" sz="3600" dirty="0">
@@ -4101,17 +4088,7 @@
                   </a:schemeClr>
                 </a:solidFill>
               </a:rPr>
-              <a:t>adjust </a:t>
-            </a:r>
-            <a:r>
-              <a:rPr lang="en-US" sz="3600" dirty="0" smtClean="0">
-                <a:solidFill>
-                  <a:schemeClr val="bg1">
-                    <a:lumMod val="65000"/>
-                  </a:schemeClr>
-                </a:solidFill>
-              </a:rPr>
-              <a:t>by first-visit State Count</a:t>
+              <a:t>adjust by first-visit State Count</a:t>
             </a:r>
             <a:r>
               <a:rPr lang="en-US" sz="3600" dirty="0">
@@ -4447,19 +4424,7 @@
             </a:r>
             <a:r>
               <a:rPr lang="en-US" sz="3600" dirty="0" smtClean="0"/>
-              <a:t>adjust </a:t>
-            </a:r>
-            <a:r>
-              <a:rPr lang="en-US" sz="3600" dirty="0" smtClean="0"/>
-              <a:t>by </a:t>
-            </a:r>
-            <a:r>
-              <a:rPr lang="en-US" sz="3600" dirty="0" smtClean="0"/>
-              <a:t>FIRST-VISIT State </a:t>
-            </a:r>
-            <a:r>
-              <a:rPr lang="en-US" sz="3600" dirty="0" smtClean="0"/>
-              <a:t>Count</a:t>
+              <a:t>adjust by FIRST-VISIT State Count</a:t>
             </a:r>
             <a:br>
               <a:rPr lang="en-US" sz="3600" dirty="0" smtClean="0"/>
@@ -4478,11 +4443,7 @@
             </a:r>
             <a:r>
               <a:rPr lang="en-US" sz="3600" dirty="0" smtClean="0"/>
-              <a:t>=10, </a:t>
-            </a:r>
-            <a:r>
-              <a:rPr lang="en-US" sz="3600" dirty="0" smtClean="0"/>
-              <a:t>start=10</a:t>
+              <a:t>=10, start=10</a:t>
             </a:r>
             <a:endParaRPr lang="en-US" sz="3600" dirty="0"/>
           </a:p>
@@ -4753,11 +4714,7 @@
             </a:r>
             <a:r>
               <a:rPr lang="en-US" sz="2800" dirty="0" smtClean="0"/>
-              <a:t>=10, </a:t>
-            </a:r>
-            <a:r>
-              <a:rPr lang="en-US" sz="2800" dirty="0" smtClean="0"/>
-              <a:t>start=10</a:t>
+              <a:t>=10, start=10</a:t>
             </a:r>
             <a:endParaRPr lang="en-US" sz="2800" dirty="0"/>
           </a:p>
@@ -4908,8 +4865,8 @@
           <a:chExt cx="0" cy="0"/>
         </a:xfrm>
       </p:grpSpPr>
-      <mc:AlternateContent xmlns:mc="http://schemas.openxmlformats.org/markup-compatibility/2006">
-        <mc:Choice xmlns:a14="http://schemas.microsoft.com/office/drawing/2010/main" Requires="a14">
+      <mc:AlternateContent xmlns:mc="http://schemas.openxmlformats.org/markup-compatibility/2006" xmlns:a14="http://schemas.microsoft.com/office/drawing/2010/main">
+        <mc:Choice Requires="a14">
           <p:sp>
             <p:nvSpPr>
               <p:cNvPr id="2" name="Title 1"/>
@@ -4953,13 +4910,7 @@
                   <a:rPr lang="en-US" sz="3600" dirty="0" smtClean="0">
                     <a:sym typeface="Symbol"/>
                   </a:rPr>
-                  <a:t>adaptive </a:t>
-                </a:r>
-                <a:r>
-                  <a:rPr lang="en-US" sz="3600" dirty="0" smtClean="0">
-                    <a:sym typeface="Symbol"/>
-                  </a:rPr>
-                  <a:t> as a function of (t)/</a:t>
+                  <a:t>adaptive  as a function of (t)/</a:t>
                 </a:r>
                 <a14:m>
                   <m:oMath xmlns:m="http://schemas.openxmlformats.org/officeDocument/2006/math">
@@ -5011,7 +4962,7 @@
             </p:txBody>
           </p:sp>
         </mc:Choice>
-        <mc:Fallback>
+        <mc:Fallback xmlns="">
           <p:sp>
             <p:nvSpPr>
               <p:cNvPr id="2" name="Title 1"/>
@@ -5241,11 +5192,7 @@
             </a:r>
             <a:r>
               <a:rPr lang="en-US" sz="3600" dirty="0" smtClean="0"/>
-              <a:t>=5, </a:t>
-            </a:r>
-            <a:r>
-              <a:rPr lang="en-US" sz="3600" dirty="0" smtClean="0"/>
-              <a:t>start=10</a:t>
+              <a:t>=5, start=10</a:t>
             </a:r>
             <a:endParaRPr lang="en-US" sz="3600" dirty="0"/>
           </a:p>
@@ -5417,15 +5364,7 @@
             </a:r>
             <a:r>
               <a:rPr lang="en-US" sz="3600" dirty="0" smtClean="0"/>
-              <a:t>, adjust by </a:t>
-            </a:r>
-            <a:r>
-              <a:rPr lang="en-US" sz="3600" dirty="0" smtClean="0"/>
-              <a:t>FIRST-VISIT State </a:t>
-            </a:r>
-            <a:r>
-              <a:rPr lang="en-US" sz="3600" dirty="0" smtClean="0"/>
-              <a:t>Count</a:t>
+              <a:t>, adjust by FIRST-VISIT State Count</a:t>
             </a:r>
             <a:br>
               <a:rPr lang="en-US" sz="3600" dirty="0" smtClean="0"/>
@@ -5444,11 +5383,7 @@
             </a:r>
             <a:r>
               <a:rPr lang="en-US" sz="3600" dirty="0" smtClean="0"/>
-              <a:t>=5, </a:t>
-            </a:r>
-            <a:r>
-              <a:rPr lang="en-US" sz="3600" dirty="0" smtClean="0"/>
-              <a:t>start=10</a:t>
+              <a:t>=5, start=10</a:t>
             </a:r>
             <a:endParaRPr lang="en-US" sz="3600" dirty="0"/>
           </a:p>
@@ -5655,11 +5590,7 @@
             </a:r>
             <a:r>
               <a:rPr lang="en-US" sz="2800" dirty="0" smtClean="0"/>
-              <a:t>=5, </a:t>
-            </a:r>
-            <a:r>
-              <a:rPr lang="en-US" sz="2800" dirty="0" smtClean="0"/>
-              <a:t>start=10</a:t>
+              <a:t>=5, start=10</a:t>
             </a:r>
             <a:endParaRPr lang="en-US" sz="2800" dirty="0"/>
           </a:p>
@@ -5891,19 +5822,12 @@
               <a:rPr lang="en-US" sz="2400" dirty="0" smtClean="0">
                 <a:sym typeface="Symbol"/>
               </a:rPr>
-              <a:t> adjusted by </a:t>
-            </a:r>
-            <a:r>
-              <a:rPr lang="en-US" sz="2400" dirty="0" smtClean="0">
-                <a:sym typeface="Symbol"/>
-              </a:rPr>
-              <a:t>FIRST-VISIT state count</a:t>
+              <a:t> adjusted by FIRST-VISIT state count</a:t>
             </a:r>
             <a:r>
               <a:rPr lang="en-US" sz="2400" dirty="0" smtClean="0"/>
               <a:t>.</a:t>
             </a:r>
-            <a:endParaRPr lang="en-US" sz="2400" dirty="0" smtClean="0"/>
           </a:p>
           <a:p>
             <a:pPr marL="457200" indent="-457200">
@@ -5928,19 +5852,7 @@
               <a:rPr lang="en-US" sz="2400" dirty="0" smtClean="0">
                 <a:sym typeface="Symbol"/>
               </a:rPr>
-              <a:t> is </a:t>
-            </a:r>
-            <a:r>
-              <a:rPr lang="en-US" sz="2400" dirty="0" smtClean="0">
-                <a:sym typeface="Symbol"/>
-              </a:rPr>
-              <a:t>observed for  = 0.8 (also for </a:t>
-            </a:r>
-            <a:r>
-              <a:rPr lang="en-US" sz="2400" dirty="0" smtClean="0">
-                <a:sym typeface="Symbol"/>
-              </a:rPr>
-              <a:t>the “ adjusted by FIRST-VISIT state count” case), with an RMSE at the end of 200 episodes very similar to the adaptive TD() case.</a:t>
+              <a:t> is observed for  = 0.8 (also for the “ adjusted by FIRST-VISIT state count” case), with an RMSE at the end of 200 episodes very similar to the adaptive TD() case.</a:t>
             </a:r>
           </a:p>
           <a:p>
@@ -5979,47 +5891,32 @@
               <a:rPr lang="en-US" sz="2400" dirty="0" smtClean="0">
                 <a:sym typeface="Symbol"/>
               </a:rPr>
-              <a:t>As expected, t</a:t>
+              <a:t>As expected, the </a:t>
+            </a:r>
+            <a:r>
+              <a:rPr lang="en-US" sz="2400" b="1" dirty="0" smtClean="0">
+                <a:sym typeface="Symbol"/>
+              </a:rPr>
+              <a:t>convergence of MC is very similar to TD(0.9)</a:t>
             </a:r>
             <a:r>
               <a:rPr lang="en-US" sz="2400" dirty="0" smtClean="0">
                 <a:sym typeface="Symbol"/>
               </a:rPr>
-              <a:t>he </a:t>
+              <a:t> --i.e. the closest we got to  = 1 in our simulations– although this is the case only when  is updated by FIRST-VISIT state count, which is </a:t>
             </a:r>
             <a:r>
               <a:rPr lang="en-US" sz="2400" b="1" dirty="0" smtClean="0">
                 <a:sym typeface="Symbol"/>
               </a:rPr>
-              <a:t>convergence of MC is very similar to TD(0.9</a:t>
-            </a:r>
-            <a:r>
-              <a:rPr lang="en-US" sz="2400" b="1" dirty="0" smtClean="0">
-                <a:sym typeface="Symbol"/>
-              </a:rPr>
-              <a:t>)</a:t>
+              <a:t>the setting under which the two algorithms are most similar</a:t>
             </a:r>
             <a:r>
               <a:rPr lang="en-US" sz="2400" dirty="0" smtClean="0">
                 <a:sym typeface="Symbol"/>
               </a:rPr>
-              <a:t> --i.e. the closest we got to  = 1 in our simulations– although this is the case only when  is updated by FIRST-VISIT state count, which is </a:t>
-            </a:r>
-            <a:r>
-              <a:rPr lang="en-US" sz="2400" b="1" dirty="0" smtClean="0">
-                <a:sym typeface="Symbol"/>
-              </a:rPr>
-              <a:t>the setting under which the two algorithms are most similar</a:t>
-            </a:r>
-            <a:r>
-              <a:rPr lang="en-US" sz="2400" dirty="0" smtClean="0">
-                <a:sym typeface="Symbol"/>
-              </a:rPr>
               <a:t>.</a:t>
             </a:r>
-            <a:endParaRPr lang="en-US" sz="2400" dirty="0" smtClean="0">
-              <a:sym typeface="Symbol"/>
-            </a:endParaRPr>
           </a:p>
           <a:p>
             <a:pPr marL="457200" indent="-457200">
@@ -6030,19 +5927,7 @@
               <a:rPr lang="en-US" sz="2400" dirty="0" smtClean="0">
                 <a:sym typeface="Symbol"/>
               </a:rPr>
-              <a:t>The convergence </a:t>
-            </a:r>
-            <a:r>
-              <a:rPr lang="en-US" sz="2400" dirty="0" smtClean="0">
-                <a:sym typeface="Symbol"/>
-              </a:rPr>
-              <a:t>to the RMSE at the last episode </a:t>
-            </a:r>
-            <a:r>
-              <a:rPr lang="en-US" sz="2400" dirty="0" smtClean="0">
-                <a:sym typeface="Symbol"/>
-              </a:rPr>
-              <a:t>is a little slower in the adaptive TD() case than in TD() for the 19-state environment, but faster for the 7-state environment.</a:t>
+              <a:t>The convergence to the RMSE at the last episode is a little slower in the adaptive TD() case than in TD() for the 19-state environment, but faster for the 7-state environment.</a:t>
             </a:r>
             <a:endParaRPr lang="en-US" sz="2400" dirty="0" smtClean="0"/>
           </a:p>
@@ -6124,8 +6009,8 @@
           </a:p>
         </p:txBody>
       </p:sp>
-      <mc:AlternateContent xmlns:mc="http://schemas.openxmlformats.org/markup-compatibility/2006">
-        <mc:Choice xmlns:a14="http://schemas.microsoft.com/office/drawing/2010/main" Requires="a14">
+      <mc:AlternateContent xmlns:mc="http://schemas.openxmlformats.org/markup-compatibility/2006" xmlns:a14="http://schemas.microsoft.com/office/drawing/2010/main">
+        <mc:Choice Requires="a14">
           <p:sp>
             <p:nvSpPr>
               <p:cNvPr id="3" name="Content Placeholder 2"/>
@@ -6145,11 +6030,7 @@
               <a:p>
                 <a:r>
                   <a:rPr lang="en-US" sz="1600" dirty="0" smtClean="0"/>
-                  <a:t>Three algorithms are analyzed on </a:t>
-                </a:r>
-                <a:r>
-                  <a:rPr lang="en-US" sz="1600" dirty="0" smtClean="0"/>
-                  <a:t>a 19+2-state and 7+2-state 1D </a:t>
+                  <a:t>Three algorithms are analyzed on a 19+2-state and 7+2-state 1D </a:t>
                 </a:r>
                 <a:r>
                   <a:rPr lang="en-US" sz="1600" dirty="0" err="1" smtClean="0"/>
@@ -6207,49 +6088,12 @@
               <a:p>
                 <a:r>
                   <a:rPr lang="en-US" sz="1600" b="1" dirty="0" smtClean="0"/>
-                  <a:t>Four set of simulations </a:t>
-                </a:r>
-                <a:r>
-                  <a:rPr lang="en-US" sz="1600" b="1" dirty="0" smtClean="0"/>
-                  <a:t>are carried out for each algorithm </a:t>
+                  <a:t>Four set of simulations are carried out for each algorithm </a:t>
                 </a:r>
                 <a:r>
                   <a:rPr lang="en-US" sz="1600" dirty="0" smtClean="0"/>
-                  <a:t>making up </a:t>
+                  <a:t>making up 12 simulations shown in 12 different pages, where the RMSE by episode averaged over 10 or 5 experiments is plotted. The four set of simulations are as follows</a:t>
                 </a:r>
-                <a:r>
-                  <a:rPr lang="en-US" sz="1600" dirty="0" smtClean="0"/>
-                  <a:t>12 </a:t>
-                </a:r>
-                <a:r>
-                  <a:rPr lang="en-US" sz="1600" dirty="0" smtClean="0"/>
-                  <a:t>simulations shown in </a:t>
-                </a:r>
-                <a:r>
-                  <a:rPr lang="en-US" sz="1600" dirty="0" smtClean="0"/>
-                  <a:t>12 different </a:t>
-                </a:r>
-                <a:r>
-                  <a:rPr lang="en-US" sz="1600" dirty="0" smtClean="0"/>
-                  <a:t>pages, where the RMSE by episode averaged over 10 </a:t>
-                </a:r>
-                <a:r>
-                  <a:rPr lang="en-US" sz="1600" dirty="0" smtClean="0"/>
-                  <a:t>or 5 experiments </a:t>
-                </a:r>
-                <a:r>
-                  <a:rPr lang="en-US" sz="1600" dirty="0" smtClean="0"/>
-                  <a:t>is </a:t>
-                </a:r>
-                <a:r>
-                  <a:rPr lang="en-US" sz="1600" dirty="0" smtClean="0"/>
-                  <a:t>plotted. The four set of </a:t>
-                </a:r>
-                <a:r>
-                  <a:rPr lang="en-US" sz="1600" dirty="0" smtClean="0"/>
-                  <a:t>simulations are as follows</a:t>
-                </a:r>
-                <a:endParaRPr lang="en-US" sz="1600" dirty="0" smtClean="0"/>
               </a:p>
               <a:p>
                 <a:pPr marL="800100" lvl="1" indent="-342900">
@@ -6263,16 +6107,7 @@
                     </a:solidFill>
                     <a:sym typeface="Symbol"/>
                   </a:rPr>
-                  <a:t> is adjusted by state </a:t>
-                </a:r>
-                <a:r>
-                  <a:rPr lang="en-US" sz="1400" dirty="0" smtClean="0">
-                    <a:solidFill>
-                      <a:schemeClr val="tx2"/>
-                    </a:solidFill>
-                    <a:sym typeface="Symbol"/>
-                  </a:rPr>
-                  <a:t>count on the 19+2-state </a:t>
+                  <a:t> is adjusted by state count on the 19+2-state </a:t>
                 </a:r>
                 <a:r>
                   <a:rPr lang="en-US" sz="1400" dirty="0" err="1" smtClean="0">
@@ -6492,25 +6327,7 @@
                     </a:solidFill>
                     <a:sym typeface="Symbol"/>
                   </a:rPr>
-                  <a:t>considered a state-dependent value that is defined </a:t>
-                </a:r>
-                <a:r>
-                  <a:rPr lang="en-US" sz="1400" i="1" dirty="0" smtClean="0">
-                    <a:solidFill>
-                      <a:schemeClr val="tx2"/>
-                    </a:solidFill>
-                    <a:sym typeface="Symbol"/>
-                  </a:rPr>
-                  <a:t>by a Boltzman</a:t>
-                </a:r>
-                <a:r>
-                  <a:rPr lang="en-US" sz="1400" i="1" dirty="0" smtClean="0">
-                    <a:solidFill>
-                      <a:schemeClr val="tx2"/>
-                    </a:solidFill>
-                    <a:sym typeface="Symbol"/>
-                  </a:rPr>
-                  <a:t>n function of (t)/V(S(t)), i.e. of the </a:t>
+                  <a:t>considered a state-dependent value that is defined by a Boltzmann function of (t)/V(S(t)), i.e. of the </a:t>
                 </a:r>
                 <a:r>
                   <a:rPr lang="en-US" sz="1400" b="1" i="1" dirty="0" smtClean="0">
@@ -6650,7 +6467,6 @@
                   <a:rPr lang="en-US" sz="1400" i="1" dirty="0" smtClean="0"/>
                   <a:t>(as is the case for middle states).</a:t>
                 </a:r>
-                <a:endParaRPr lang="en-US" sz="1400" i="1" dirty="0" smtClean="0"/>
               </a:p>
               <a:p>
                 <a:r>
@@ -6671,22 +6487,13 @@
                   </a:rPr>
                   <a:t>are considered and compared.</a:t>
                 </a:r>
-                <a:endParaRPr lang="en-US" sz="1600" dirty="0" smtClean="0">
-                  <a:sym typeface="Symbol"/>
-                </a:endParaRPr>
               </a:p>
               <a:p>
                 <a:r>
                   <a:rPr lang="en-US" sz="1600" i="1" dirty="0" smtClean="0">
                     <a:sym typeface="Symbol"/>
                   </a:rPr>
-                  <a:t>All </a:t>
-                </a:r>
-                <a:r>
-                  <a:rPr lang="en-US" sz="1600" i="1" dirty="0" smtClean="0">
-                    <a:sym typeface="Symbol"/>
-                  </a:rPr>
-                  <a:t>plots on the LHS are visually comparable as they use the same scale.</a:t>
+                  <a:t>All plots on the LHS are visually comparable as they use the same scale.</a:t>
                 </a:r>
               </a:p>
               <a:p>
@@ -6701,7 +6508,7 @@
             </p:txBody>
           </p:sp>
         </mc:Choice>
-        <mc:Fallback>
+        <mc:Fallback xmlns="">
           <p:sp>
             <p:nvSpPr>
               <p:cNvPr id="3" name="Content Placeholder 2"/>
@@ -6886,13 +6693,7 @@
               <a:rPr lang="en-US" sz="2400" dirty="0" smtClean="0">
                 <a:sym typeface="Symbol"/>
               </a:rPr>
-              <a:t>, </a:t>
-            </a:r>
-            <a:r>
-              <a:rPr lang="en-US" sz="2400" dirty="0" smtClean="0">
-                <a:sym typeface="Symbol"/>
-              </a:rPr>
-              <a:t>we may conclude that:</a:t>
+              <a:t>, we may conclude that:</a:t>
             </a:r>
             <a:endParaRPr lang="en-US" sz="2400" dirty="0" smtClean="0"/>
           </a:p>
@@ -7152,7 +6953,19 @@
               <a:rPr lang="en-US" sz="2400" dirty="0" smtClean="0">
                 <a:sym typeface="Symbol"/>
               </a:rPr>
-              <a:t>, or even slightly better (in terms of faster convergence and possibly slightly slower RMSE), with the great advantage that there is no need to specify the value</a:t>
+              <a:t>, or even slightly better (in terms of faster convergence and possibly slightly </a:t>
+            </a:r>
+            <a:r>
+              <a:rPr lang="en-US" sz="2400" dirty="0" smtClean="0">
+                <a:sym typeface="Symbol"/>
+              </a:rPr>
+              <a:t>lower </a:t>
+            </a:r>
+            <a:r>
+              <a:rPr lang="en-US" sz="2400" dirty="0" smtClean="0">
+                <a:sym typeface="Symbol"/>
+              </a:rPr>
+              <a:t>RMSE), with the great advantage that there is no need to specify the value</a:t>
             </a:r>
             <a:r>
               <a:rPr lang="en-US" sz="2400" dirty="0">
@@ -7221,37 +7034,25 @@
               <a:rPr lang="en-US" sz="2400" dirty="0" smtClean="0">
                 <a:sym typeface="Symbol"/>
               </a:rPr>
-              <a:t>)--</a:t>
+              <a:t>)--, the </a:t>
+            </a:r>
+            <a:r>
+              <a:rPr lang="en-US" sz="2400" b="1" dirty="0" smtClean="0">
+                <a:sym typeface="Symbol"/>
+              </a:rPr>
+              <a:t>best one </a:t>
             </a:r>
             <a:r>
               <a:rPr lang="en-US" sz="2400" dirty="0" smtClean="0">
                 <a:sym typeface="Symbol"/>
               </a:rPr>
-              <a:t>, the </a:t>
+              <a:t>(smaller RMSE, faster convergence) chooses </a:t>
             </a:r>
             <a:r>
               <a:rPr lang="en-US" sz="2400" b="1" dirty="0" smtClean="0">
                 <a:sym typeface="Symbol"/>
               </a:rPr>
-              <a:t>best one </a:t>
-            </a:r>
-            <a:r>
-              <a:rPr lang="en-US" sz="2400" dirty="0" smtClean="0">
-                <a:sym typeface="Symbol"/>
-              </a:rPr>
-              <a:t>(smaller RMSE, faster convergence) chooses </a:t>
-            </a:r>
-            <a:r>
-              <a:rPr lang="en-US" sz="2400" b="1" dirty="0" smtClean="0">
-                <a:sym typeface="Symbol"/>
-              </a:rPr>
-              <a:t> as a function of the target erro</a:t>
-            </a:r>
-            <a:r>
-              <a:rPr lang="en-US" sz="2400" b="1" dirty="0" smtClean="0">
-                <a:sym typeface="Symbol"/>
-              </a:rPr>
-              <a:t>r relative to the average state value function estimate </a:t>
+              <a:t> as a function of the target error relative to the average state value function estimate </a:t>
             </a:r>
             <a:r>
               <a:rPr lang="en-US" sz="2400" dirty="0" smtClean="0">
@@ -7371,7 +7172,7 @@
               <a:rPr lang="en-US" dirty="0" smtClean="0">
                 <a:sym typeface="Symbol"/>
               </a:rPr>
-              <a:t>DRAFT</a:t>
+              <a:t>APPENDIX</a:t>
             </a:r>
             <a:endParaRPr lang="en-US" dirty="0"/>
           </a:p>
@@ -7469,50 +7270,49 @@
         <p:spPr/>
         <p:txBody>
           <a:bodyPr>
-            <a:normAutofit fontScale="90000"/>
+            <a:normAutofit/>
           </a:bodyPr>
           <a:lstStyle/>
           <a:p>
             <a:r>
-              <a:rPr lang="en-US" dirty="0" smtClean="0"/>
-              <a:t>Adaptive TD(</a:t>
-            </a:r>
-            <a:r>
-              <a:rPr lang="en-US" dirty="0" smtClean="0">
-                <a:sym typeface="Symbol"/>
-              </a:rPr>
-              <a:t>) -  distribution</a:t>
+              <a:rPr lang="en-US" sz="2800" dirty="0" smtClean="0">
+                <a:sym typeface="Symbol"/>
+              </a:rPr>
+              <a:t>Distribution of  by </a:t>
+            </a:r>
+            <a:r>
+              <a:rPr lang="en-US" sz="2800" smtClean="0">
+                <a:sym typeface="Symbol"/>
+              </a:rPr>
+              <a:t>state over time</a:t>
+            </a:r>
+            <a:r>
+              <a:rPr lang="en-US" sz="2800" dirty="0" smtClean="0">
+                <a:sym typeface="Symbol"/>
+              </a:rPr>
+              <a:t/>
             </a:r>
             <a:br>
-              <a:rPr lang="en-US" dirty="0" smtClean="0">
+              <a:rPr lang="en-US" sz="2800" dirty="0" smtClean="0">
                 <a:sym typeface="Symbol"/>
               </a:rPr>
             </a:br>
             <a:r>
-              <a:rPr lang="en-US" sz="3100" dirty="0" smtClean="0">
-                <a:sym typeface="Symbol"/>
-              </a:rPr>
-              <a:t>Three ways of </a:t>
-            </a:r>
-            <a:r>
-              <a:rPr lang="en-US" sz="3100" dirty="0" smtClean="0">
-                <a:sym typeface="Symbol"/>
-              </a:rPr>
-              <a:t>adjusting  as a function of </a:t>
-            </a:r>
-            <a:r>
-              <a:rPr lang="en-US" sz="3100" dirty="0" smtClean="0">
-                <a:sym typeface="Symbol"/>
-              </a:rPr>
-              <a:t>(t</a:t>
-            </a:r>
-            <a:r>
-              <a:rPr lang="en-US" sz="3100" dirty="0" smtClean="0">
-                <a:sym typeface="Symbol"/>
-              </a:rPr>
-              <a:t>)</a:t>
-            </a:r>
-            <a:endParaRPr lang="en-US" sz="3100" dirty="0"/>
+              <a:rPr lang="en-US" sz="2400" dirty="0" smtClean="0">
+                <a:sym typeface="Symbol"/>
+              </a:rPr>
+              <a:t>Boltzmann law is a function of (t)/</a:t>
+            </a:r>
+            <a:r>
+              <a:rPr lang="en-US" sz="2400" i="1" dirty="0" smtClean="0">
+                <a:solidFill>
+                  <a:srgbClr val="C00000"/>
+                </a:solidFill>
+                <a:sym typeface="Symbol"/>
+              </a:rPr>
+              <a:t>V(S(t))</a:t>
+            </a:r>
+            <a:endParaRPr lang="en-US" sz="2400" dirty="0"/>
           </a:p>
         </p:txBody>
       </p:sp>
@@ -7534,6 +7334,2148 @@
             <a:fld id="{62D96F91-737B-4795-86FD-3CFC620DA94D}" type="slidenum">
               <a:rPr lang="en-US" smtClean="0"/>
               <a:t>23</a:t>
+            </a:fld>
+            <a:endParaRPr lang="en-US"/>
+          </a:p>
+        </p:txBody>
+      </p:sp>
+      <p:sp>
+        <p:nvSpPr>
+          <p:cNvPr id="5" name="TextBox 4"/>
+          <p:cNvSpPr txBox="1"/>
+          <p:nvPr/>
+        </p:nvSpPr>
+        <p:spPr>
+          <a:xfrm>
+            <a:off x="106271" y="1773977"/>
+            <a:ext cx="1064715" cy="523220"/>
+          </a:xfrm>
+          <a:prstGeom prst="rect">
+            <a:avLst/>
+          </a:prstGeom>
+          <a:noFill/>
+        </p:spPr>
+        <p:txBody>
+          <a:bodyPr wrap="none" rtlCol="0">
+            <a:spAutoFit/>
+          </a:bodyPr>
+          <a:lstStyle/>
+          <a:p>
+            <a:pPr algn="ctr"/>
+            <a:r>
+              <a:rPr lang="en-US" sz="1400" b="1" dirty="0" smtClean="0"/>
+              <a:t>First</a:t>
+            </a:r>
+          </a:p>
+          <a:p>
+            <a:pPr algn="ctr"/>
+            <a:r>
+              <a:rPr lang="en-US" sz="1400" b="1" dirty="0" smtClean="0"/>
+              <a:t>20 episodes</a:t>
+            </a:r>
+            <a:endParaRPr lang="en-US" sz="1400" b="1" dirty="0"/>
+          </a:p>
+        </p:txBody>
+      </p:sp>
+      <p:pic>
+        <p:nvPicPr>
+          <p:cNvPr id="1026" name="Picture 2"/>
+          <p:cNvPicPr>
+            <a:picLocks noChangeArrowheads="1"/>
+          </p:cNvPicPr>
+          <p:nvPr/>
+        </p:nvPicPr>
+        <p:blipFill rotWithShape="1">
+          <a:blip r:embed="rId2">
+            <a:extLst>
+              <a:ext uri="{28A0092B-C50C-407E-A947-70E740481C1C}">
+                <a14:useLocalDpi xmlns:a14="http://schemas.microsoft.com/office/drawing/2010/main" val="0"/>
+              </a:ext>
+            </a:extLst>
+          </a:blip>
+          <a:srcRect l="9056" t="15873" r="5323" b="10232"/>
+          <a:stretch/>
+        </p:blipFill>
+        <p:spPr bwMode="auto">
+          <a:xfrm>
+            <a:off x="1255988" y="1404257"/>
+            <a:ext cx="7852516" cy="1440000"/>
+          </a:xfrm>
+          <a:prstGeom prst="rect">
+            <a:avLst/>
+          </a:prstGeom>
+          <a:noFill/>
+          <a:ln w="9525">
+            <a:solidFill>
+              <a:schemeClr val="tx1"/>
+            </a:solidFill>
+            <a:miter lim="800000"/>
+            <a:headEnd/>
+            <a:tailEnd/>
+          </a:ln>
+          <a:extLst>
+            <a:ext uri="{909E8E84-426E-40DD-AFC4-6F175D3DCCD1}">
+              <a14:hiddenFill xmlns:a14="http://schemas.microsoft.com/office/drawing/2010/main">
+                <a:solidFill>
+                  <a:schemeClr val="accent1"/>
+                </a:solidFill>
+              </a14:hiddenFill>
+            </a:ext>
+          </a:extLst>
+        </p:spPr>
+      </p:pic>
+      <p:pic>
+        <p:nvPicPr>
+          <p:cNvPr id="1027" name="Picture 3"/>
+          <p:cNvPicPr>
+            <a:picLocks noChangeArrowheads="1"/>
+          </p:cNvPicPr>
+          <p:nvPr/>
+        </p:nvPicPr>
+        <p:blipFill rotWithShape="1">
+          <a:blip r:embed="rId3">
+            <a:extLst>
+              <a:ext uri="{28A0092B-C50C-407E-A947-70E740481C1C}">
+                <a14:useLocalDpi xmlns:a14="http://schemas.microsoft.com/office/drawing/2010/main" val="0"/>
+              </a:ext>
+            </a:extLst>
+          </a:blip>
+          <a:srcRect l="8792" t="16675" r="4260" b="10611"/>
+          <a:stretch/>
+        </p:blipFill>
+        <p:spPr bwMode="auto">
+          <a:xfrm>
+            <a:off x="1245119" y="2968486"/>
+            <a:ext cx="7884368" cy="1440000"/>
+          </a:xfrm>
+          <a:prstGeom prst="rect">
+            <a:avLst/>
+          </a:prstGeom>
+          <a:noFill/>
+          <a:ln w="9525">
+            <a:solidFill>
+              <a:schemeClr val="tx1"/>
+            </a:solidFill>
+            <a:miter lim="800000"/>
+            <a:headEnd/>
+            <a:tailEnd/>
+          </a:ln>
+          <a:extLst>
+            <a:ext uri="{909E8E84-426E-40DD-AFC4-6F175D3DCCD1}">
+              <a14:hiddenFill xmlns:a14="http://schemas.microsoft.com/office/drawing/2010/main">
+                <a:solidFill>
+                  <a:schemeClr val="accent1"/>
+                </a:solidFill>
+              </a14:hiddenFill>
+            </a:ext>
+          </a:extLst>
+        </p:spPr>
+      </p:pic>
+      <p:pic>
+        <p:nvPicPr>
+          <p:cNvPr id="3" name="Picture 4"/>
+          <p:cNvPicPr>
+            <a:picLocks noChangeArrowheads="1"/>
+          </p:cNvPicPr>
+          <p:nvPr/>
+        </p:nvPicPr>
+        <p:blipFill rotWithShape="1">
+          <a:blip r:embed="rId4">
+            <a:extLst>
+              <a:ext uri="{28A0092B-C50C-407E-A947-70E740481C1C}">
+                <a14:useLocalDpi xmlns:a14="http://schemas.microsoft.com/office/drawing/2010/main" val="0"/>
+              </a:ext>
+            </a:extLst>
+          </a:blip>
+          <a:srcRect l="8718" t="15897" r="4064" b="8443"/>
+          <a:stretch/>
+        </p:blipFill>
+        <p:spPr bwMode="auto">
+          <a:xfrm>
+            <a:off x="1246721" y="4553113"/>
+            <a:ext cx="7882765" cy="1440000"/>
+          </a:xfrm>
+          <a:prstGeom prst="rect">
+            <a:avLst/>
+          </a:prstGeom>
+          <a:noFill/>
+          <a:ln w="9525">
+            <a:solidFill>
+              <a:schemeClr val="tx1"/>
+            </a:solidFill>
+            <a:miter lim="800000"/>
+            <a:headEnd/>
+            <a:tailEnd/>
+          </a:ln>
+          <a:extLst>
+            <a:ext uri="{909E8E84-426E-40DD-AFC4-6F175D3DCCD1}">
+              <a14:hiddenFill xmlns:a14="http://schemas.microsoft.com/office/drawing/2010/main">
+                <a:solidFill>
+                  <a:schemeClr val="accent1"/>
+                </a:solidFill>
+              </a14:hiddenFill>
+            </a:ext>
+          </a:extLst>
+        </p:spPr>
+      </p:pic>
+      <p:sp>
+        <p:nvSpPr>
+          <p:cNvPr id="11" name="TextBox 10"/>
+          <p:cNvSpPr txBox="1"/>
+          <p:nvPr/>
+        </p:nvSpPr>
+        <p:spPr>
+          <a:xfrm>
+            <a:off x="145587" y="3356992"/>
+            <a:ext cx="1156087" cy="523220"/>
+          </a:xfrm>
+          <a:prstGeom prst="rect">
+            <a:avLst/>
+          </a:prstGeom>
+          <a:noFill/>
+        </p:spPr>
+        <p:txBody>
+          <a:bodyPr wrap="none" rtlCol="0">
+            <a:spAutoFit/>
+          </a:bodyPr>
+          <a:lstStyle/>
+          <a:p>
+            <a:pPr algn="ctr"/>
+            <a:r>
+              <a:rPr lang="en-US" sz="1400" b="1" dirty="0" smtClean="0"/>
+              <a:t>First</a:t>
+            </a:r>
+          </a:p>
+          <a:p>
+            <a:pPr algn="ctr"/>
+            <a:r>
+              <a:rPr lang="en-US" sz="1400" b="1" dirty="0" smtClean="0"/>
+              <a:t>200 episodes</a:t>
+            </a:r>
+            <a:endParaRPr lang="en-US" sz="1400" b="1" dirty="0"/>
+          </a:p>
+        </p:txBody>
+      </p:sp>
+      <p:sp>
+        <p:nvSpPr>
+          <p:cNvPr id="12" name="TextBox 11"/>
+          <p:cNvSpPr txBox="1"/>
+          <p:nvPr/>
+        </p:nvSpPr>
+        <p:spPr>
+          <a:xfrm>
+            <a:off x="99608" y="5013176"/>
+            <a:ext cx="1247457" cy="523220"/>
+          </a:xfrm>
+          <a:prstGeom prst="rect">
+            <a:avLst/>
+          </a:prstGeom>
+          <a:noFill/>
+        </p:spPr>
+        <p:txBody>
+          <a:bodyPr wrap="none" rtlCol="0">
+            <a:spAutoFit/>
+          </a:bodyPr>
+          <a:lstStyle/>
+          <a:p>
+            <a:pPr algn="ctr"/>
+            <a:r>
+              <a:rPr lang="en-US" sz="1400" b="1" dirty="0" smtClean="0"/>
+              <a:t>First</a:t>
+            </a:r>
+          </a:p>
+          <a:p>
+            <a:pPr algn="ctr"/>
+            <a:r>
+              <a:rPr lang="en-US" sz="1400" b="1" dirty="0" smtClean="0"/>
+              <a:t>1000 episodes</a:t>
+            </a:r>
+            <a:endParaRPr lang="en-US" sz="1400" b="1" dirty="0"/>
+          </a:p>
+        </p:txBody>
+      </p:sp>
+      <p:sp>
+        <p:nvSpPr>
+          <p:cNvPr id="6" name="TextBox 5"/>
+          <p:cNvSpPr txBox="1"/>
+          <p:nvPr/>
+        </p:nvSpPr>
+        <p:spPr>
+          <a:xfrm>
+            <a:off x="253509" y="5982379"/>
+            <a:ext cx="8422947" cy="830997"/>
+          </a:xfrm>
+          <a:prstGeom prst="rect">
+            <a:avLst/>
+          </a:prstGeom>
+          <a:noFill/>
+        </p:spPr>
+        <p:txBody>
+          <a:bodyPr wrap="square" rtlCol="0">
+            <a:spAutoFit/>
+          </a:bodyPr>
+          <a:lstStyle/>
+          <a:p>
+            <a:r>
+              <a:rPr lang="en-US" sz="1600" dirty="0" smtClean="0"/>
+              <a:t>We observe that the distribution of </a:t>
+            </a:r>
+            <a:r>
+              <a:rPr lang="en-US" sz="1600" dirty="0" smtClean="0">
+                <a:sym typeface="Symbol"/>
+              </a:rPr>
+              <a:t> by state tends to an Atari shape… which is </a:t>
+            </a:r>
+            <a:r>
+              <a:rPr lang="en-US" sz="1600" b="1" dirty="0" smtClean="0">
+                <a:sym typeface="Symbol"/>
+              </a:rPr>
+              <a:t>due to the division by V(S(t)) which is very small for middle states</a:t>
+            </a:r>
+            <a:r>
+              <a:rPr lang="en-US" sz="1600" dirty="0" smtClean="0">
+                <a:sym typeface="Symbol"/>
+              </a:rPr>
+              <a:t>, explaining the larger values of  for those states compared to border states.</a:t>
+            </a:r>
+            <a:endParaRPr lang="en-US" sz="1600" dirty="0"/>
+          </a:p>
+        </p:txBody>
+      </p:sp>
+    </p:spTree>
+    <p:extLst>
+      <p:ext uri="{BB962C8B-B14F-4D97-AF65-F5344CB8AC3E}">
+        <p14:creationId xmlns:p14="http://schemas.microsoft.com/office/powerpoint/2010/main" val="2648480913"/>
+      </p:ext>
+    </p:extLst>
+  </p:cSld>
+  <p:clrMapOvr>
+    <a:masterClrMapping/>
+  </p:clrMapOvr>
+  <p:timing>
+    <p:tnLst>
+      <p:par>
+        <p:cTn id="1" dur="indefinite" restart="never" nodeType="tmRoot"/>
+      </p:par>
+    </p:tnLst>
+  </p:timing>
+</p:sld>
+</file>
+
+<file path=ppt/slides/slide24.xml><?xml version="1.0" encoding="utf-8"?>
+<p:sld xmlns:a="http://schemas.openxmlformats.org/drawingml/2006/main" xmlns:r="http://schemas.openxmlformats.org/officeDocument/2006/relationships" xmlns:p="http://schemas.openxmlformats.org/presentationml/2006/main">
+  <p:cSld>
+    <p:spTree>
+      <p:nvGrpSpPr>
+        <p:cNvPr id="1" name=""/>
+        <p:cNvGrpSpPr/>
+        <p:nvPr/>
+      </p:nvGrpSpPr>
+      <p:grpSpPr>
+        <a:xfrm>
+          <a:off x="0" y="0"/>
+          <a:ext cx="0" cy="0"/>
+          <a:chOff x="0" y="0"/>
+          <a:chExt cx="0" cy="0"/>
+        </a:xfrm>
+      </p:grpSpPr>
+      <mc:AlternateContent xmlns:mc="http://schemas.openxmlformats.org/markup-compatibility/2006">
+        <mc:Choice xmlns:a14="http://schemas.microsoft.com/office/drawing/2010/main" Requires="a14">
+          <p:sp>
+            <p:nvSpPr>
+              <p:cNvPr id="2" name="Title 1"/>
+              <p:cNvSpPr>
+                <a:spLocks noGrp="1"/>
+              </p:cNvSpPr>
+              <p:nvPr>
+                <p:ph type="title"/>
+              </p:nvPr>
+            </p:nvSpPr>
+            <p:spPr/>
+            <p:txBody>
+              <a:bodyPr>
+                <a:noAutofit/>
+              </a:bodyPr>
+              <a:lstStyle/>
+              <a:p>
+                <a:r>
+                  <a:rPr lang="en-US" sz="2800" dirty="0" smtClean="0">
+                    <a:sym typeface="Symbol"/>
+                  </a:rPr>
+                  <a:t>Distribution </a:t>
+                </a:r>
+                <a:r>
+                  <a:rPr lang="en-US" sz="2800" dirty="0">
+                    <a:sym typeface="Symbol"/>
+                  </a:rPr>
+                  <a:t>of  by state </a:t>
+                </a:r>
+                <a:r>
+                  <a:rPr lang="en-US" sz="2800" dirty="0" smtClean="0">
+                    <a:sym typeface="Symbol"/>
+                  </a:rPr>
+                  <a:t>over time</a:t>
+                </a:r>
+                <a:r>
+                  <a:rPr lang="en-US" sz="2800" dirty="0">
+                    <a:sym typeface="Symbol"/>
+                  </a:rPr>
+                  <a:t/>
+                </a:r>
+                <a:br>
+                  <a:rPr lang="en-US" sz="2800" dirty="0">
+                    <a:sym typeface="Symbol"/>
+                  </a:rPr>
+                </a:br>
+                <a:r>
+                  <a:rPr lang="en-US" sz="2400" dirty="0" smtClean="0">
+                    <a:sym typeface="Symbol"/>
+                  </a:rPr>
+                  <a:t>Boltzmann </a:t>
+                </a:r>
+                <a:r>
+                  <a:rPr lang="en-US" sz="2400" dirty="0">
+                    <a:sym typeface="Symbol"/>
+                  </a:rPr>
+                  <a:t>law </a:t>
+                </a:r>
+                <a:r>
+                  <a:rPr lang="en-US" sz="2400" dirty="0" smtClean="0">
+                    <a:sym typeface="Symbol"/>
+                  </a:rPr>
+                  <a:t>is </a:t>
+                </a:r>
+                <a:r>
+                  <a:rPr lang="en-US" sz="2400" dirty="0">
+                    <a:sym typeface="Symbol"/>
+                  </a:rPr>
+                  <a:t>a function of (t</a:t>
+                </a:r>
+                <a:r>
+                  <a:rPr lang="en-US" sz="2400" dirty="0" smtClean="0">
+                    <a:sym typeface="Symbol"/>
+                  </a:rPr>
+                  <a:t>)/</a:t>
+                </a:r>
+                <a14:m>
+                  <m:oMath xmlns:m="http://schemas.openxmlformats.org/officeDocument/2006/math">
+                    <m:acc>
+                      <m:accPr>
+                        <m:chr m:val="̅"/>
+                        <m:ctrlPr>
+                          <a:rPr lang="en-US" sz="2400" i="1" smtClean="0">
+                            <a:solidFill>
+                              <a:srgbClr val="00B050"/>
+                            </a:solidFill>
+                            <a:latin typeface="Cambria Math"/>
+                            <a:sym typeface="Symbol"/>
+                          </a:rPr>
+                        </m:ctrlPr>
+                      </m:accPr>
+                      <m:e>
+                        <m:r>
+                          <a:rPr lang="en-US" sz="2400" b="0" i="1" smtClean="0">
+                            <a:solidFill>
+                              <a:srgbClr val="00B050"/>
+                            </a:solidFill>
+                            <a:latin typeface="Cambria Math"/>
+                            <a:sym typeface="Symbol"/>
+                          </a:rPr>
+                          <m:t>𝑉</m:t>
+                        </m:r>
+                      </m:e>
+                    </m:acc>
+                    <m:r>
+                      <a:rPr lang="en-US" sz="2400" b="0" i="1" smtClean="0">
+                        <a:solidFill>
+                          <a:srgbClr val="00B050"/>
+                        </a:solidFill>
+                        <a:latin typeface="Cambria Math"/>
+                        <a:sym typeface="Symbol"/>
+                      </a:rPr>
+                      <m:t>(</m:t>
+                    </m:r>
+                    <m:r>
+                      <a:rPr lang="en-US" sz="2400" b="0" i="1" smtClean="0">
+                        <a:solidFill>
+                          <a:srgbClr val="00B050"/>
+                        </a:solidFill>
+                        <a:latin typeface="Cambria Math"/>
+                        <a:sym typeface="Symbol"/>
+                      </a:rPr>
+                      <m:t>𝑡</m:t>
+                    </m:r>
+                    <m:r>
+                      <a:rPr lang="en-US" sz="2400" b="0" i="1" smtClean="0">
+                        <a:solidFill>
+                          <a:srgbClr val="00B050"/>
+                        </a:solidFill>
+                        <a:latin typeface="Cambria Math"/>
+                        <a:sym typeface="Symbol"/>
+                      </a:rPr>
+                      <m:t>)</m:t>
+                    </m:r>
+                  </m:oMath>
+                </a14:m>
+                <a:endParaRPr lang="en-US" sz="2800" dirty="0"/>
+              </a:p>
+            </p:txBody>
+          </p:sp>
+        </mc:Choice>
+        <mc:Fallback>
+          <p:sp>
+            <p:nvSpPr>
+              <p:cNvPr id="2" name="Title 1"/>
+              <p:cNvSpPr>
+                <a:spLocks noGrp="1" noRot="1" noChangeAspect="1" noMove="1" noResize="1" noEditPoints="1" noAdjustHandles="1" noChangeArrowheads="1" noChangeShapeType="1" noTextEdit="1"/>
+              </p:cNvSpPr>
+              <p:nvPr>
+                <p:ph type="title"/>
+              </p:nvPr>
+            </p:nvSpPr>
+            <p:spPr>
+              <a:blipFill rotWithShape="1">
+                <a:blip r:embed="rId2"/>
+                <a:stretch>
+                  <a:fillRect b="-532"/>
+                </a:stretch>
+              </a:blipFill>
+            </p:spPr>
+            <p:txBody>
+              <a:bodyPr/>
+              <a:lstStyle/>
+              <a:p>
+                <a:r>
+                  <a:rPr lang="en-US">
+                    <a:noFill/>
+                  </a:rPr>
+                  <a:t> </a:t>
+                </a:r>
+              </a:p>
+            </p:txBody>
+          </p:sp>
+        </mc:Fallback>
+      </mc:AlternateContent>
+      <p:sp>
+        <p:nvSpPr>
+          <p:cNvPr id="3" name="Slide Number Placeholder 2"/>
+          <p:cNvSpPr>
+            <a:spLocks noGrp="1"/>
+          </p:cNvSpPr>
+          <p:nvPr>
+            <p:ph type="sldNum" sz="quarter" idx="12"/>
+          </p:nvPr>
+        </p:nvSpPr>
+        <p:spPr/>
+        <p:txBody>
+          <a:bodyPr/>
+          <a:lstStyle/>
+          <a:p>
+            <a:fld id="{62D96F91-737B-4795-86FD-3CFC620DA94D}" type="slidenum">
+              <a:rPr lang="en-US" smtClean="0"/>
+              <a:t>24</a:t>
+            </a:fld>
+            <a:endParaRPr lang="en-US"/>
+          </a:p>
+        </p:txBody>
+      </p:sp>
+      <p:sp>
+        <p:nvSpPr>
+          <p:cNvPr id="5" name="TextBox 4"/>
+          <p:cNvSpPr txBox="1"/>
+          <p:nvPr/>
+        </p:nvSpPr>
+        <p:spPr>
+          <a:xfrm>
+            <a:off x="253509" y="5243714"/>
+            <a:ext cx="8422947" cy="1077218"/>
+          </a:xfrm>
+          <a:prstGeom prst="rect">
+            <a:avLst/>
+          </a:prstGeom>
+          <a:noFill/>
+        </p:spPr>
+        <p:txBody>
+          <a:bodyPr wrap="square" rtlCol="0">
+            <a:spAutoFit/>
+          </a:bodyPr>
+          <a:lstStyle/>
+          <a:p>
+            <a:r>
+              <a:rPr lang="en-US" sz="1600" dirty="0" smtClean="0"/>
+              <a:t>In this case </a:t>
+            </a:r>
+            <a:r>
+              <a:rPr lang="en-US" sz="1600" b="1" dirty="0" smtClean="0"/>
+              <a:t>we avoid a division by a very small state value</a:t>
+            </a:r>
+            <a:r>
+              <a:rPr lang="en-US" sz="1600" dirty="0" smtClean="0"/>
+              <a:t> for middle states by replacing V(S(t)) with the value function averaged over all states at time t. This still gives a </a:t>
+            </a:r>
+            <a:r>
+              <a:rPr lang="en-US" sz="1600" b="1" dirty="0" smtClean="0"/>
+              <a:t>qualitative measure of the magnitude of </a:t>
+            </a:r>
+            <a:r>
+              <a:rPr lang="en-US" sz="1600" b="1" dirty="0" smtClean="0">
+                <a:sym typeface="Symbol"/>
+              </a:rPr>
+              <a:t>(t)</a:t>
+            </a:r>
+            <a:r>
+              <a:rPr lang="en-US" sz="1600" dirty="0">
+                <a:sym typeface="Symbol"/>
+              </a:rPr>
+              <a:t> </a:t>
+            </a:r>
+            <a:r>
+              <a:rPr lang="en-US" sz="1600" dirty="0" smtClean="0">
+                <a:sym typeface="Symbol"/>
+              </a:rPr>
+              <a:t>(i.e. whether it is large or small) which is essential to correctly define . After introducing this change we see that the state distribution of  tends to </a:t>
+            </a:r>
+            <a:r>
+              <a:rPr lang="en-US" sz="1600" b="1" dirty="0" smtClean="0">
+                <a:sym typeface="Symbol"/>
+              </a:rPr>
+              <a:t>almost a constant value</a:t>
+            </a:r>
+            <a:r>
+              <a:rPr lang="en-US" sz="1600" dirty="0" smtClean="0">
+                <a:sym typeface="Symbol"/>
+              </a:rPr>
+              <a:t>.</a:t>
+            </a:r>
+            <a:endParaRPr lang="en-US" sz="1600" dirty="0"/>
+          </a:p>
+        </p:txBody>
+      </p:sp>
+      <p:sp>
+        <p:nvSpPr>
+          <p:cNvPr id="6" name="TextBox 5"/>
+          <p:cNvSpPr txBox="1"/>
+          <p:nvPr/>
+        </p:nvSpPr>
+        <p:spPr>
+          <a:xfrm>
+            <a:off x="253509" y="6309320"/>
+            <a:ext cx="8422947" cy="523220"/>
+          </a:xfrm>
+          <a:prstGeom prst="rect">
+            <a:avLst/>
+          </a:prstGeom>
+          <a:noFill/>
+        </p:spPr>
+        <p:txBody>
+          <a:bodyPr wrap="square" rtlCol="0">
+            <a:spAutoFit/>
+          </a:bodyPr>
+          <a:lstStyle/>
+          <a:p>
+            <a:r>
+              <a:rPr lang="en-US" sz="1400" i="1" dirty="0" smtClean="0"/>
+              <a:t>Note that the constant value is a characteristic of this 1D </a:t>
+            </a:r>
+            <a:r>
+              <a:rPr lang="en-US" sz="1400" i="1" dirty="0" err="1" smtClean="0"/>
+              <a:t>gridworld</a:t>
+            </a:r>
+            <a:r>
+              <a:rPr lang="en-US" sz="1400" i="1" dirty="0" smtClean="0"/>
+              <a:t>, where all state values differ from their </a:t>
+            </a:r>
+            <a:r>
+              <a:rPr lang="en-US" sz="1400" i="1" dirty="0" err="1" smtClean="0"/>
+              <a:t>neighbour’s</a:t>
+            </a:r>
+            <a:r>
+              <a:rPr lang="en-US" sz="1400" i="1" dirty="0" smtClean="0"/>
+              <a:t> by a constant value (= 0.1 in the 19-state 1D </a:t>
+            </a:r>
+            <a:r>
+              <a:rPr lang="en-US" sz="1400" i="1" dirty="0" err="1" smtClean="0"/>
+              <a:t>gridworld</a:t>
+            </a:r>
+            <a:r>
+              <a:rPr lang="en-US" sz="1400" i="1" dirty="0" smtClean="0"/>
+              <a:t>).</a:t>
+            </a:r>
+            <a:endParaRPr lang="en-US" sz="1400" i="1" dirty="0"/>
+          </a:p>
+        </p:txBody>
+      </p:sp>
+      <p:pic>
+        <p:nvPicPr>
+          <p:cNvPr id="2051" name="Picture 3"/>
+          <p:cNvPicPr>
+            <a:picLocks noChangeAspect="1" noChangeArrowheads="1"/>
+          </p:cNvPicPr>
+          <p:nvPr/>
+        </p:nvPicPr>
+        <p:blipFill rotWithShape="1">
+          <a:blip r:embed="rId3">
+            <a:extLst>
+              <a:ext uri="{28A0092B-C50C-407E-A947-70E740481C1C}">
+                <a14:useLocalDpi xmlns:a14="http://schemas.microsoft.com/office/drawing/2010/main" val="0"/>
+              </a:ext>
+            </a:extLst>
+          </a:blip>
+          <a:srcRect l="9252" t="10058" r="5938" b="8747"/>
+          <a:stretch/>
+        </p:blipFill>
+        <p:spPr bwMode="auto">
+          <a:xfrm>
+            <a:off x="899592" y="1340768"/>
+            <a:ext cx="7546270" cy="3903243"/>
+          </a:xfrm>
+          <a:prstGeom prst="rect">
+            <a:avLst/>
+          </a:prstGeom>
+          <a:noFill/>
+          <a:ln>
+            <a:noFill/>
+          </a:ln>
+          <a:extLst>
+            <a:ext uri="{909E8E84-426E-40DD-AFC4-6F175D3DCCD1}">
+              <a14:hiddenFill xmlns:a14="http://schemas.microsoft.com/office/drawing/2010/main">
+                <a:solidFill>
+                  <a:schemeClr val="accent1"/>
+                </a:solidFill>
+              </a14:hiddenFill>
+            </a:ext>
+            <a:ext uri="{91240B29-F687-4F45-9708-019B960494DF}">
+              <a14:hiddenLine xmlns:a14="http://schemas.microsoft.com/office/drawing/2010/main" w="9525">
+                <a:solidFill>
+                  <a:schemeClr val="tx1"/>
+                </a:solidFill>
+                <a:miter lim="800000"/>
+                <a:headEnd/>
+                <a:tailEnd/>
+              </a14:hiddenLine>
+            </a:ext>
+          </a:extLst>
+        </p:spPr>
+      </p:pic>
+    </p:spTree>
+    <p:extLst>
+      <p:ext uri="{BB962C8B-B14F-4D97-AF65-F5344CB8AC3E}">
+        <p14:creationId xmlns:p14="http://schemas.microsoft.com/office/powerpoint/2010/main" val="2085373619"/>
+      </p:ext>
+    </p:extLst>
+  </p:cSld>
+  <p:clrMapOvr>
+    <a:masterClrMapping/>
+  </p:clrMapOvr>
+</p:sld>
+</file>
+
+<file path=ppt/slides/slide25.xml><?xml version="1.0" encoding="utf-8"?>
+<p:sld xmlns:a="http://schemas.openxmlformats.org/drawingml/2006/main" xmlns:r="http://schemas.openxmlformats.org/officeDocument/2006/relationships" xmlns:p="http://schemas.openxmlformats.org/presentationml/2006/main">
+  <p:cSld>
+    <p:spTree>
+      <p:nvGrpSpPr>
+        <p:cNvPr id="1" name=""/>
+        <p:cNvGrpSpPr/>
+        <p:nvPr/>
+      </p:nvGrpSpPr>
+      <p:grpSpPr>
+        <a:xfrm>
+          <a:off x="0" y="0"/>
+          <a:ext cx="0" cy="0"/>
+          <a:chOff x="0" y="0"/>
+          <a:chExt cx="0" cy="0"/>
+        </a:xfrm>
+      </p:grpSpPr>
+      <p:sp>
+        <p:nvSpPr>
+          <p:cNvPr id="2" name="Title 1"/>
+          <p:cNvSpPr>
+            <a:spLocks noGrp="1"/>
+          </p:cNvSpPr>
+          <p:nvPr>
+            <p:ph type="title"/>
+          </p:nvPr>
+        </p:nvSpPr>
+        <p:spPr/>
+        <p:txBody>
+          <a:bodyPr>
+            <a:noAutofit/>
+          </a:bodyPr>
+          <a:lstStyle/>
+          <a:p>
+            <a:r>
+              <a:rPr lang="en-US" sz="2800" dirty="0" smtClean="0"/>
+              <a:t>Comparison of the average </a:t>
+            </a:r>
+            <a:r>
+              <a:rPr lang="en-US" sz="2800" dirty="0" smtClean="0">
+                <a:sym typeface="Symbol"/>
+              </a:rPr>
+              <a:t> by episode and estimated value function between the two Boltzmann laws</a:t>
+            </a:r>
+            <a:endParaRPr lang="en-US" sz="2800" dirty="0"/>
+          </a:p>
+        </p:txBody>
+      </p:sp>
+      <p:sp>
+        <p:nvSpPr>
+          <p:cNvPr id="3" name="Slide Number Placeholder 2"/>
+          <p:cNvSpPr>
+            <a:spLocks noGrp="1"/>
+          </p:cNvSpPr>
+          <p:nvPr>
+            <p:ph type="sldNum" sz="quarter" idx="12"/>
+          </p:nvPr>
+        </p:nvSpPr>
+        <p:spPr/>
+        <p:txBody>
+          <a:bodyPr/>
+          <a:lstStyle/>
+          <a:p>
+            <a:fld id="{62D96F91-737B-4795-86FD-3CFC620DA94D}" type="slidenum">
+              <a:rPr lang="en-US" smtClean="0"/>
+              <a:t>25</a:t>
+            </a:fld>
+            <a:endParaRPr lang="en-US"/>
+          </a:p>
+        </p:txBody>
+      </p:sp>
+      <p:pic>
+        <p:nvPicPr>
+          <p:cNvPr id="3074" name="Picture 2"/>
+          <p:cNvPicPr>
+            <a:picLocks noChangeAspect="1" noChangeArrowheads="1"/>
+          </p:cNvPicPr>
+          <p:nvPr/>
+        </p:nvPicPr>
+        <p:blipFill rotWithShape="1">
+          <a:blip r:embed="rId2">
+            <a:extLst>
+              <a:ext uri="{28A0092B-C50C-407E-A947-70E740481C1C}">
+                <a14:useLocalDpi xmlns:a14="http://schemas.microsoft.com/office/drawing/2010/main" val="0"/>
+              </a:ext>
+            </a:extLst>
+          </a:blip>
+          <a:srcRect l="2465" t="23568" b="5875"/>
+          <a:stretch/>
+        </p:blipFill>
+        <p:spPr bwMode="auto">
+          <a:xfrm>
+            <a:off x="1222156" y="1710100"/>
+            <a:ext cx="2771016" cy="1782827"/>
+          </a:xfrm>
+          <a:prstGeom prst="rect">
+            <a:avLst/>
+          </a:prstGeom>
+          <a:noFill/>
+          <a:ln>
+            <a:noFill/>
+          </a:ln>
+          <a:extLst>
+            <a:ext uri="{909E8E84-426E-40DD-AFC4-6F175D3DCCD1}">
+              <a14:hiddenFill xmlns:a14="http://schemas.microsoft.com/office/drawing/2010/main">
+                <a:solidFill>
+                  <a:schemeClr val="accent1"/>
+                </a:solidFill>
+              </a14:hiddenFill>
+            </a:ext>
+            <a:ext uri="{91240B29-F687-4F45-9708-019B960494DF}">
+              <a14:hiddenLine xmlns:a14="http://schemas.microsoft.com/office/drawing/2010/main" w="9525">
+                <a:solidFill>
+                  <a:schemeClr val="tx1"/>
+                </a:solidFill>
+                <a:miter lim="800000"/>
+                <a:headEnd/>
+                <a:tailEnd/>
+              </a14:hiddenLine>
+            </a:ext>
+          </a:extLst>
+        </p:spPr>
+      </p:pic>
+      <p:pic>
+        <p:nvPicPr>
+          <p:cNvPr id="3075" name="Picture 3"/>
+          <p:cNvPicPr>
+            <a:picLocks noChangeAspect="1" noChangeArrowheads="1"/>
+          </p:cNvPicPr>
+          <p:nvPr/>
+        </p:nvPicPr>
+        <p:blipFill rotWithShape="1">
+          <a:blip r:embed="rId3">
+            <a:extLst>
+              <a:ext uri="{28A0092B-C50C-407E-A947-70E740481C1C}">
+                <a14:useLocalDpi xmlns:a14="http://schemas.microsoft.com/office/drawing/2010/main" val="0"/>
+              </a:ext>
+            </a:extLst>
+          </a:blip>
+          <a:srcRect l="3296" t="23128" b="5024"/>
+          <a:stretch/>
+        </p:blipFill>
+        <p:spPr bwMode="auto">
+          <a:xfrm>
+            <a:off x="5153336" y="1681081"/>
+            <a:ext cx="2747396" cy="1815475"/>
+          </a:xfrm>
+          <a:prstGeom prst="rect">
+            <a:avLst/>
+          </a:prstGeom>
+          <a:noFill/>
+          <a:ln>
+            <a:noFill/>
+          </a:ln>
+          <a:extLst>
+            <a:ext uri="{909E8E84-426E-40DD-AFC4-6F175D3DCCD1}">
+              <a14:hiddenFill xmlns:a14="http://schemas.microsoft.com/office/drawing/2010/main">
+                <a:solidFill>
+                  <a:schemeClr val="accent1"/>
+                </a:solidFill>
+              </a14:hiddenFill>
+            </a:ext>
+            <a:ext uri="{91240B29-F687-4F45-9708-019B960494DF}">
+              <a14:hiddenLine xmlns:a14="http://schemas.microsoft.com/office/drawing/2010/main" w="9525">
+                <a:solidFill>
+                  <a:schemeClr val="tx1"/>
+                </a:solidFill>
+                <a:miter lim="800000"/>
+                <a:headEnd/>
+                <a:tailEnd/>
+              </a14:hiddenLine>
+            </a:ext>
+          </a:extLst>
+        </p:spPr>
+      </p:pic>
+      <p:pic>
+        <p:nvPicPr>
+          <p:cNvPr id="3076" name="Picture 4"/>
+          <p:cNvPicPr>
+            <a:picLocks noChangeAspect="1" noChangeArrowheads="1"/>
+          </p:cNvPicPr>
+          <p:nvPr/>
+        </p:nvPicPr>
+        <p:blipFill rotWithShape="1">
+          <a:blip r:embed="rId4">
+            <a:extLst>
+              <a:ext uri="{28A0092B-C50C-407E-A947-70E740481C1C}">
+                <a14:useLocalDpi xmlns:a14="http://schemas.microsoft.com/office/drawing/2010/main" val="0"/>
+              </a:ext>
+            </a:extLst>
+          </a:blip>
+          <a:srcRect l="2883" t="23551" r="7585" b="8846"/>
+          <a:stretch/>
+        </p:blipFill>
+        <p:spPr bwMode="auto">
+          <a:xfrm>
+            <a:off x="5135870" y="3496556"/>
+            <a:ext cx="2543659" cy="1708213"/>
+          </a:xfrm>
+          <a:prstGeom prst="rect">
+            <a:avLst/>
+          </a:prstGeom>
+          <a:noFill/>
+          <a:ln>
+            <a:noFill/>
+          </a:ln>
+          <a:extLst>
+            <a:ext uri="{909E8E84-426E-40DD-AFC4-6F175D3DCCD1}">
+              <a14:hiddenFill xmlns:a14="http://schemas.microsoft.com/office/drawing/2010/main">
+                <a:solidFill>
+                  <a:schemeClr val="accent1"/>
+                </a:solidFill>
+              </a14:hiddenFill>
+            </a:ext>
+            <a:ext uri="{91240B29-F687-4F45-9708-019B960494DF}">
+              <a14:hiddenLine xmlns:a14="http://schemas.microsoft.com/office/drawing/2010/main" w="9525">
+                <a:solidFill>
+                  <a:schemeClr val="tx1"/>
+                </a:solidFill>
+                <a:miter lim="800000"/>
+                <a:headEnd/>
+                <a:tailEnd/>
+              </a14:hiddenLine>
+            </a:ext>
+          </a:extLst>
+        </p:spPr>
+      </p:pic>
+      <p:pic>
+        <p:nvPicPr>
+          <p:cNvPr id="3077" name="Picture 5"/>
+          <p:cNvPicPr>
+            <a:picLocks noChangeAspect="1" noChangeArrowheads="1"/>
+          </p:cNvPicPr>
+          <p:nvPr/>
+        </p:nvPicPr>
+        <p:blipFill rotWithShape="1">
+          <a:blip r:embed="rId5">
+            <a:extLst>
+              <a:ext uri="{28A0092B-C50C-407E-A947-70E740481C1C}">
+                <a14:useLocalDpi xmlns:a14="http://schemas.microsoft.com/office/drawing/2010/main" val="0"/>
+              </a:ext>
+            </a:extLst>
+          </a:blip>
+          <a:srcRect l="2788" t="23688" r="6625" b="9003"/>
+          <a:stretch/>
+        </p:blipFill>
+        <p:spPr bwMode="auto">
+          <a:xfrm>
+            <a:off x="1238093" y="3496556"/>
+            <a:ext cx="2573587" cy="1700761"/>
+          </a:xfrm>
+          <a:prstGeom prst="rect">
+            <a:avLst/>
+          </a:prstGeom>
+          <a:noFill/>
+          <a:ln>
+            <a:noFill/>
+          </a:ln>
+          <a:extLst>
+            <a:ext uri="{909E8E84-426E-40DD-AFC4-6F175D3DCCD1}">
+              <a14:hiddenFill xmlns:a14="http://schemas.microsoft.com/office/drawing/2010/main">
+                <a:solidFill>
+                  <a:schemeClr val="accent1"/>
+                </a:solidFill>
+              </a14:hiddenFill>
+            </a:ext>
+            <a:ext uri="{91240B29-F687-4F45-9708-019B960494DF}">
+              <a14:hiddenLine xmlns:a14="http://schemas.microsoft.com/office/drawing/2010/main" w="9525">
+                <a:solidFill>
+                  <a:schemeClr val="tx1"/>
+                </a:solidFill>
+                <a:miter lim="800000"/>
+                <a:headEnd/>
+                <a:tailEnd/>
+              </a14:hiddenLine>
+            </a:ext>
+          </a:extLst>
+        </p:spPr>
+      </p:pic>
+      <p:sp>
+        <p:nvSpPr>
+          <p:cNvPr id="4" name="TextBox 3"/>
+          <p:cNvSpPr txBox="1"/>
+          <p:nvPr/>
+        </p:nvSpPr>
+        <p:spPr>
+          <a:xfrm>
+            <a:off x="1403648" y="1340768"/>
+            <a:ext cx="2408032" cy="369332"/>
+          </a:xfrm>
+          <a:prstGeom prst="rect">
+            <a:avLst/>
+          </a:prstGeom>
+          <a:noFill/>
+        </p:spPr>
+        <p:txBody>
+          <a:bodyPr wrap="none" rtlCol="0">
+            <a:spAutoFit/>
+          </a:bodyPr>
+          <a:lstStyle/>
+          <a:p>
+            <a:r>
+              <a:rPr lang="en-US" b="1" dirty="0" smtClean="0">
+                <a:solidFill>
+                  <a:srgbClr val="C00000"/>
+                </a:solidFill>
+                <a:sym typeface="Symbol"/>
+              </a:rPr>
+              <a:t>Boltzmann(</a:t>
+            </a:r>
+            <a:r>
+              <a:rPr lang="en-US" b="1" dirty="0">
+                <a:solidFill>
+                  <a:srgbClr val="C00000"/>
+                </a:solidFill>
+                <a:sym typeface="Symbol"/>
+              </a:rPr>
+              <a:t>(t)/</a:t>
+            </a:r>
+            <a:r>
+              <a:rPr lang="en-US" b="1" i="1" dirty="0">
+                <a:solidFill>
+                  <a:srgbClr val="C00000"/>
+                </a:solidFill>
+                <a:sym typeface="Symbol"/>
+              </a:rPr>
+              <a:t>V(S(t</a:t>
+            </a:r>
+            <a:r>
+              <a:rPr lang="en-US" b="1" i="1" dirty="0" smtClean="0">
+                <a:solidFill>
+                  <a:srgbClr val="C00000"/>
+                </a:solidFill>
+                <a:sym typeface="Symbol"/>
+              </a:rPr>
+              <a:t>))</a:t>
+            </a:r>
+            <a:r>
+              <a:rPr lang="en-US" b="1" dirty="0" smtClean="0">
+                <a:solidFill>
+                  <a:srgbClr val="C00000"/>
+                </a:solidFill>
+                <a:sym typeface="Symbol"/>
+              </a:rPr>
+              <a:t>)</a:t>
+            </a:r>
+            <a:endParaRPr lang="en-US" b="1" dirty="0">
+              <a:solidFill>
+                <a:srgbClr val="C00000"/>
+              </a:solidFill>
+            </a:endParaRPr>
+          </a:p>
+        </p:txBody>
+      </p:sp>
+      <mc:AlternateContent xmlns:mc="http://schemas.openxmlformats.org/markup-compatibility/2006">
+        <mc:Choice xmlns:a14="http://schemas.microsoft.com/office/drawing/2010/main" Requires="a14">
+          <p:sp>
+            <p:nvSpPr>
+              <p:cNvPr id="9" name="TextBox 8"/>
+              <p:cNvSpPr txBox="1"/>
+              <p:nvPr/>
+            </p:nvSpPr>
+            <p:spPr>
+              <a:xfrm>
+                <a:off x="5545654" y="1356704"/>
+                <a:ext cx="2236638" cy="369332"/>
+              </a:xfrm>
+              <a:prstGeom prst="rect">
+                <a:avLst/>
+              </a:prstGeom>
+              <a:noFill/>
+            </p:spPr>
+            <p:txBody>
+              <a:bodyPr wrap="none" rtlCol="0">
+                <a:spAutoFit/>
+              </a:bodyPr>
+              <a:lstStyle/>
+              <a:p>
+                <a:r>
+                  <a:rPr lang="en-US" b="1" dirty="0" smtClean="0">
+                    <a:solidFill>
+                      <a:srgbClr val="00B050"/>
+                    </a:solidFill>
+                    <a:sym typeface="Symbol"/>
+                  </a:rPr>
+                  <a:t>Boltzmann(</a:t>
+                </a:r>
+                <a:r>
+                  <a:rPr lang="en-US" b="1" dirty="0">
+                    <a:solidFill>
+                      <a:srgbClr val="00B050"/>
+                    </a:solidFill>
+                    <a:sym typeface="Symbol"/>
+                  </a:rPr>
+                  <a:t>(t)/</a:t>
+                </a:r>
+                <a14:m>
+                  <m:oMath xmlns:m="http://schemas.openxmlformats.org/officeDocument/2006/math">
+                    <m:acc>
+                      <m:accPr>
+                        <m:chr m:val="̅"/>
+                        <m:ctrlPr>
+                          <a:rPr lang="en-US" b="1" i="1">
+                            <a:solidFill>
+                              <a:srgbClr val="00B050"/>
+                            </a:solidFill>
+                            <a:latin typeface="Cambria Math"/>
+                            <a:sym typeface="Symbol"/>
+                          </a:rPr>
+                        </m:ctrlPr>
+                      </m:accPr>
+                      <m:e>
+                        <m:r>
+                          <a:rPr lang="en-US" b="1" i="1">
+                            <a:solidFill>
+                              <a:srgbClr val="00B050"/>
+                            </a:solidFill>
+                            <a:latin typeface="Cambria Math"/>
+                            <a:sym typeface="Symbol"/>
+                          </a:rPr>
+                          <m:t>𝑽</m:t>
+                        </m:r>
+                      </m:e>
+                    </m:acc>
+                    <m:r>
+                      <a:rPr lang="en-US" b="1" i="1">
+                        <a:solidFill>
+                          <a:srgbClr val="00B050"/>
+                        </a:solidFill>
+                        <a:latin typeface="Cambria Math"/>
+                        <a:sym typeface="Symbol"/>
+                      </a:rPr>
+                      <m:t>(</m:t>
+                    </m:r>
+                    <m:r>
+                      <a:rPr lang="en-US" b="1" i="1">
+                        <a:solidFill>
+                          <a:srgbClr val="00B050"/>
+                        </a:solidFill>
+                        <a:latin typeface="Cambria Math"/>
+                        <a:sym typeface="Symbol"/>
+                      </a:rPr>
+                      <m:t>𝒕</m:t>
+                    </m:r>
+                    <m:r>
+                      <a:rPr lang="en-US" b="1" i="1">
+                        <a:solidFill>
+                          <a:srgbClr val="00B050"/>
+                        </a:solidFill>
+                        <a:latin typeface="Cambria Math"/>
+                        <a:sym typeface="Symbol"/>
+                      </a:rPr>
+                      <m:t>)</m:t>
+                    </m:r>
+                  </m:oMath>
+                </a14:m>
+                <a:r>
+                  <a:rPr lang="en-US" b="1" dirty="0" smtClean="0">
+                    <a:solidFill>
+                      <a:srgbClr val="00B050"/>
+                    </a:solidFill>
+                    <a:sym typeface="Symbol"/>
+                  </a:rPr>
+                  <a:t>)</a:t>
+                </a:r>
+                <a:endParaRPr lang="en-US" b="1" dirty="0">
+                  <a:solidFill>
+                    <a:srgbClr val="00B050"/>
+                  </a:solidFill>
+                </a:endParaRPr>
+              </a:p>
+            </p:txBody>
+          </p:sp>
+        </mc:Choice>
+        <mc:Fallback>
+          <p:sp>
+            <p:nvSpPr>
+              <p:cNvPr id="9" name="TextBox 8"/>
+              <p:cNvSpPr txBox="1">
+                <a:spLocks noRot="1" noChangeAspect="1" noMove="1" noResize="1" noEditPoints="1" noAdjustHandles="1" noChangeArrowheads="1" noChangeShapeType="1" noTextEdit="1"/>
+              </p:cNvSpPr>
+              <p:nvPr/>
+            </p:nvSpPr>
+            <p:spPr>
+              <a:xfrm>
+                <a:off x="5545654" y="1356704"/>
+                <a:ext cx="2236638" cy="369332"/>
+              </a:xfrm>
+              <a:prstGeom prst="rect">
+                <a:avLst/>
+              </a:prstGeom>
+              <a:blipFill rotWithShape="1">
+                <a:blip r:embed="rId6"/>
+                <a:stretch>
+                  <a:fillRect l="-2452" t="-11667" r="-1635" b="-26667"/>
+                </a:stretch>
+              </a:blipFill>
+            </p:spPr>
+            <p:txBody>
+              <a:bodyPr/>
+              <a:lstStyle/>
+              <a:p>
+                <a:r>
+                  <a:rPr lang="en-US">
+                    <a:noFill/>
+                  </a:rPr>
+                  <a:t> </a:t>
+                </a:r>
+              </a:p>
+            </p:txBody>
+          </p:sp>
+        </mc:Fallback>
+      </mc:AlternateContent>
+      <p:sp>
+        <p:nvSpPr>
+          <p:cNvPr id="10" name="TextBox 9"/>
+          <p:cNvSpPr txBox="1"/>
+          <p:nvPr/>
+        </p:nvSpPr>
+        <p:spPr>
+          <a:xfrm>
+            <a:off x="253509" y="5229200"/>
+            <a:ext cx="8422947" cy="830997"/>
+          </a:xfrm>
+          <a:prstGeom prst="rect">
+            <a:avLst/>
+          </a:prstGeom>
+          <a:noFill/>
+        </p:spPr>
+        <p:txBody>
+          <a:bodyPr wrap="square" rtlCol="0">
+            <a:spAutoFit/>
+          </a:bodyPr>
+          <a:lstStyle/>
+          <a:p>
+            <a:r>
+              <a:rPr lang="en-US" sz="1600" dirty="0" smtClean="0"/>
+              <a:t>Both estimated functions after 1000 episodes are of good quality, but the </a:t>
+            </a:r>
+            <a:r>
+              <a:rPr lang="en-US" sz="1600" b="1" dirty="0" smtClean="0">
+                <a:solidFill>
+                  <a:srgbClr val="C00000"/>
+                </a:solidFill>
+              </a:rPr>
+              <a:t>red Boltzmann law</a:t>
+            </a:r>
+            <a:r>
+              <a:rPr lang="en-US" sz="1600" dirty="0" smtClean="0"/>
+              <a:t> (left) generates a </a:t>
+            </a:r>
+            <a:r>
+              <a:rPr lang="en-US" sz="1600" b="1" dirty="0" smtClean="0">
+                <a:solidFill>
+                  <a:srgbClr val="C00000"/>
+                </a:solidFill>
+              </a:rPr>
+              <a:t>very “noisy” </a:t>
+            </a:r>
+            <a:r>
+              <a:rPr lang="en-US" sz="1600" b="1" dirty="0" smtClean="0">
+                <a:solidFill>
+                  <a:srgbClr val="C00000"/>
+                </a:solidFill>
+                <a:sym typeface="Symbol"/>
+              </a:rPr>
+              <a:t> structure</a:t>
+            </a:r>
+            <a:r>
+              <a:rPr lang="en-US" sz="1600" dirty="0" smtClean="0">
+                <a:sym typeface="Symbol"/>
+              </a:rPr>
+              <a:t>, which is clearly an artifact since, near convergence, all states have similar (t)’s, namely around 0.1, which is the difference in state value for contiguous states.</a:t>
+            </a:r>
+            <a:endParaRPr lang="en-US" sz="1600" dirty="0"/>
+          </a:p>
+        </p:txBody>
+      </p:sp>
+      <mc:AlternateContent xmlns:mc="http://schemas.openxmlformats.org/markup-compatibility/2006">
+        <mc:Choice xmlns:a14="http://schemas.microsoft.com/office/drawing/2010/main" Requires="a14">
+          <p:sp>
+            <p:nvSpPr>
+              <p:cNvPr id="11" name="TextBox 10"/>
+              <p:cNvSpPr txBox="1"/>
+              <p:nvPr/>
+            </p:nvSpPr>
+            <p:spPr>
+              <a:xfrm>
+                <a:off x="238994" y="6084585"/>
+                <a:ext cx="8422947" cy="584775"/>
+              </a:xfrm>
+              <a:prstGeom prst="rect">
+                <a:avLst/>
+              </a:prstGeom>
+              <a:noFill/>
+            </p:spPr>
+            <p:txBody>
+              <a:bodyPr wrap="square" rtlCol="0">
+                <a:spAutoFit/>
+              </a:bodyPr>
+              <a:lstStyle/>
+              <a:p>
+                <a:r>
+                  <a:rPr lang="en-US" sz="1600" dirty="0" smtClean="0"/>
+                  <a:t>On the contrary, the </a:t>
+                </a:r>
+                <a:r>
+                  <a:rPr lang="en-US" sz="1600" b="1" dirty="0" smtClean="0">
+                    <a:solidFill>
+                      <a:srgbClr val="00B050"/>
+                    </a:solidFill>
+                  </a:rPr>
+                  <a:t>green Boltzmann law</a:t>
+                </a:r>
+                <a:r>
+                  <a:rPr lang="en-US" sz="1600" dirty="0" smtClean="0"/>
+                  <a:t> (right) generates a </a:t>
+                </a:r>
+                <a:r>
+                  <a:rPr lang="en-US" sz="1600" b="1" dirty="0" smtClean="0">
+                    <a:solidFill>
+                      <a:srgbClr val="00B050"/>
+                    </a:solidFill>
+                    <a:sym typeface="Symbol"/>
+                  </a:rPr>
+                  <a:t> structure that converges to ~ 0.2</a:t>
+                </a:r>
+                <a:r>
+                  <a:rPr lang="en-US" sz="1600" dirty="0" smtClean="0">
+                    <a:sym typeface="Symbol"/>
+                  </a:rPr>
+                  <a:t>, which is ~ 1 – </a:t>
+                </a:r>
+                <a:r>
+                  <a:rPr lang="en-US" sz="1600" dirty="0" err="1" smtClean="0">
+                    <a:sym typeface="Symbol"/>
+                  </a:rPr>
+                  <a:t>exp</a:t>
+                </a:r>
+                <a:r>
+                  <a:rPr lang="en-US" sz="1600" dirty="0" smtClean="0">
+                    <a:sym typeface="Symbol"/>
+                  </a:rPr>
+                  <a:t>(-0.1/0.5) = 0.18, which comes from the fact that () ~= 0.1 is and </a:t>
+                </a:r>
+                <a14:m>
+                  <m:oMath xmlns:m="http://schemas.openxmlformats.org/officeDocument/2006/math">
+                    <m:acc>
+                      <m:accPr>
+                        <m:chr m:val="̅"/>
+                        <m:ctrlPr>
+                          <a:rPr lang="en-US" sz="1600" i="1" smtClean="0">
+                            <a:solidFill>
+                              <a:schemeClr val="tx1"/>
+                            </a:solidFill>
+                            <a:latin typeface="Cambria Math"/>
+                            <a:sym typeface="Symbol"/>
+                          </a:rPr>
+                        </m:ctrlPr>
+                      </m:accPr>
+                      <m:e>
+                        <m:r>
+                          <a:rPr lang="en-US" sz="1600" b="0" i="1">
+                            <a:solidFill>
+                              <a:schemeClr val="tx1"/>
+                            </a:solidFill>
+                            <a:latin typeface="Cambria Math"/>
+                            <a:sym typeface="Symbol"/>
+                          </a:rPr>
+                          <m:t>𝑉</m:t>
+                        </m:r>
+                      </m:e>
+                    </m:acc>
+                    <m:r>
+                      <a:rPr lang="en-US" sz="1600" b="0" i="1">
+                        <a:solidFill>
+                          <a:schemeClr val="tx1"/>
+                        </a:solidFill>
+                        <a:latin typeface="Cambria Math"/>
+                        <a:sym typeface="Symbol"/>
+                      </a:rPr>
+                      <m:t>(</m:t>
+                    </m:r>
+                    <m:r>
+                      <a:rPr lang="en-US" sz="1600" b="0" i="1" smtClean="0">
+                        <a:solidFill>
+                          <a:schemeClr val="tx1"/>
+                        </a:solidFill>
+                        <a:latin typeface="Cambria Math"/>
+                        <a:sym typeface="Symbol"/>
+                      </a:rPr>
+                      <m:t></m:t>
+                    </m:r>
+                    <m:r>
+                      <a:rPr lang="en-US" sz="1600" b="0" i="1">
+                        <a:solidFill>
+                          <a:schemeClr val="tx1"/>
+                        </a:solidFill>
+                        <a:latin typeface="Cambria Math"/>
+                        <a:sym typeface="Symbol"/>
+                      </a:rPr>
+                      <m:t>)</m:t>
+                    </m:r>
+                  </m:oMath>
+                </a14:m>
+                <a:r>
+                  <a:rPr lang="en-US" sz="1600" dirty="0" smtClean="0">
+                    <a:sym typeface="Symbol"/>
+                  </a:rPr>
+                  <a:t> ~= 0.5. </a:t>
+                </a:r>
+                <a:endParaRPr lang="en-US" sz="1600" dirty="0"/>
+              </a:p>
+            </p:txBody>
+          </p:sp>
+        </mc:Choice>
+        <mc:Fallback>
+          <p:sp>
+            <p:nvSpPr>
+              <p:cNvPr id="11" name="TextBox 10"/>
+              <p:cNvSpPr txBox="1">
+                <a:spLocks noRot="1" noChangeAspect="1" noMove="1" noResize="1" noEditPoints="1" noAdjustHandles="1" noChangeArrowheads="1" noChangeShapeType="1" noTextEdit="1"/>
+              </p:cNvSpPr>
+              <p:nvPr/>
+            </p:nvSpPr>
+            <p:spPr>
+              <a:xfrm>
+                <a:off x="238994" y="6084585"/>
+                <a:ext cx="8422947" cy="584775"/>
+              </a:xfrm>
+              <a:prstGeom prst="rect">
+                <a:avLst/>
+              </a:prstGeom>
+              <a:blipFill rotWithShape="1">
+                <a:blip r:embed="rId7"/>
+                <a:stretch>
+                  <a:fillRect l="-362" t="-4167" b="-13542"/>
+                </a:stretch>
+              </a:blipFill>
+            </p:spPr>
+            <p:txBody>
+              <a:bodyPr/>
+              <a:lstStyle/>
+              <a:p>
+                <a:r>
+                  <a:rPr lang="en-US">
+                    <a:noFill/>
+                  </a:rPr>
+                  <a:t> </a:t>
+                </a:r>
+              </a:p>
+            </p:txBody>
+          </p:sp>
+        </mc:Fallback>
+      </mc:AlternateContent>
+    </p:spTree>
+    <p:extLst>
+      <p:ext uri="{BB962C8B-B14F-4D97-AF65-F5344CB8AC3E}">
+        <p14:creationId xmlns:p14="http://schemas.microsoft.com/office/powerpoint/2010/main" val="3677060310"/>
+      </p:ext>
+    </p:extLst>
+  </p:cSld>
+  <p:clrMapOvr>
+    <a:masterClrMapping/>
+  </p:clrMapOvr>
+</p:sld>
+</file>
+
+<file path=ppt/slides/slide26.xml><?xml version="1.0" encoding="utf-8"?>
+<p:sld xmlns:a="http://schemas.openxmlformats.org/drawingml/2006/main" xmlns:r="http://schemas.openxmlformats.org/officeDocument/2006/relationships" xmlns:p="http://schemas.openxmlformats.org/presentationml/2006/main">
+  <p:cSld>
+    <p:spTree>
+      <p:nvGrpSpPr>
+        <p:cNvPr id="1" name=""/>
+        <p:cNvGrpSpPr/>
+        <p:nvPr/>
+      </p:nvGrpSpPr>
+      <p:grpSpPr>
+        <a:xfrm>
+          <a:off x="0" y="0"/>
+          <a:ext cx="0" cy="0"/>
+          <a:chOff x="0" y="0"/>
+          <a:chExt cx="0" cy="0"/>
+        </a:xfrm>
+      </p:grpSpPr>
+      <p:sp>
+        <p:nvSpPr>
+          <p:cNvPr id="2" name="Title 1"/>
+          <p:cNvSpPr>
+            <a:spLocks noGrp="1"/>
+          </p:cNvSpPr>
+          <p:nvPr>
+            <p:ph type="title"/>
+          </p:nvPr>
+        </p:nvSpPr>
+        <p:spPr/>
+        <p:txBody>
+          <a:bodyPr>
+            <a:normAutofit/>
+          </a:bodyPr>
+          <a:lstStyle/>
+          <a:p>
+            <a:r>
+              <a:rPr lang="en-US" sz="3600" dirty="0" smtClean="0"/>
+              <a:t>When </a:t>
+            </a:r>
+            <a:r>
+              <a:rPr lang="en-US" sz="3600" dirty="0" smtClean="0">
+                <a:sym typeface="Symbol"/>
+              </a:rPr>
+              <a:t> is adjusted by the </a:t>
+            </a:r>
+            <a:r>
+              <a:rPr lang="en-US" sz="3600" i="1" dirty="0" smtClean="0">
+                <a:sym typeface="Symbol"/>
+              </a:rPr>
+              <a:t>absolute</a:t>
+            </a:r>
+            <a:r>
+              <a:rPr lang="en-US" sz="3600" dirty="0" smtClean="0">
+                <a:sym typeface="Symbol"/>
+              </a:rPr>
+              <a:t> (t)…</a:t>
+            </a:r>
+            <a:br>
+              <a:rPr lang="en-US" sz="3600" dirty="0" smtClean="0">
+                <a:sym typeface="Symbol"/>
+              </a:rPr>
+            </a:br>
+            <a:r>
+              <a:rPr lang="en-US" sz="2400" dirty="0" smtClean="0">
+                <a:sym typeface="Symbol"/>
+              </a:rPr>
+              <a:t>Boltzmann </a:t>
+            </a:r>
+            <a:r>
+              <a:rPr lang="en-US" sz="2400" dirty="0">
+                <a:sym typeface="Symbol"/>
+              </a:rPr>
+              <a:t>law is a </a:t>
+            </a:r>
+            <a:r>
+              <a:rPr lang="en-US" sz="2400" dirty="0" smtClean="0">
+                <a:sym typeface="Symbol"/>
+              </a:rPr>
+              <a:t>function of (t)</a:t>
+            </a:r>
+            <a:endParaRPr lang="en-US" sz="2400" dirty="0"/>
+          </a:p>
+        </p:txBody>
+      </p:sp>
+      <p:sp>
+        <p:nvSpPr>
+          <p:cNvPr id="3" name="Slide Number Placeholder 2"/>
+          <p:cNvSpPr>
+            <a:spLocks noGrp="1"/>
+          </p:cNvSpPr>
+          <p:nvPr>
+            <p:ph type="sldNum" sz="quarter" idx="12"/>
+          </p:nvPr>
+        </p:nvSpPr>
+        <p:spPr/>
+        <p:txBody>
+          <a:bodyPr/>
+          <a:lstStyle/>
+          <a:p>
+            <a:fld id="{62D96F91-737B-4795-86FD-3CFC620DA94D}" type="slidenum">
+              <a:rPr lang="en-US" smtClean="0"/>
+              <a:t>26</a:t>
+            </a:fld>
+            <a:endParaRPr lang="en-US"/>
+          </a:p>
+        </p:txBody>
+      </p:sp>
+      <p:pic>
+        <p:nvPicPr>
+          <p:cNvPr id="4098" name="Picture 2"/>
+          <p:cNvPicPr>
+            <a:picLocks noChangeAspect="1" noChangeArrowheads="1"/>
+          </p:cNvPicPr>
+          <p:nvPr/>
+        </p:nvPicPr>
+        <p:blipFill rotWithShape="1">
+          <a:blip r:embed="rId2">
+            <a:extLst>
+              <a:ext uri="{28A0092B-C50C-407E-A947-70E740481C1C}">
+                <a14:useLocalDpi xmlns:a14="http://schemas.microsoft.com/office/drawing/2010/main" val="0"/>
+              </a:ext>
+            </a:extLst>
+          </a:blip>
+          <a:srcRect l="3405" t="23434" b="5113"/>
+          <a:stretch/>
+        </p:blipFill>
+        <p:spPr bwMode="auto">
+          <a:xfrm>
+            <a:off x="5148064" y="1875091"/>
+            <a:ext cx="3456384" cy="2273989"/>
+          </a:xfrm>
+          <a:prstGeom prst="rect">
+            <a:avLst/>
+          </a:prstGeom>
+          <a:noFill/>
+          <a:ln>
+            <a:noFill/>
+          </a:ln>
+          <a:extLst>
+            <a:ext uri="{909E8E84-426E-40DD-AFC4-6F175D3DCCD1}">
+              <a14:hiddenFill xmlns:a14="http://schemas.microsoft.com/office/drawing/2010/main">
+                <a:solidFill>
+                  <a:schemeClr val="accent1"/>
+                </a:solidFill>
+              </a14:hiddenFill>
+            </a:ext>
+            <a:ext uri="{91240B29-F687-4F45-9708-019B960494DF}">
+              <a14:hiddenLine xmlns:a14="http://schemas.microsoft.com/office/drawing/2010/main" w="9525">
+                <a:solidFill>
+                  <a:schemeClr val="tx1"/>
+                </a:solidFill>
+                <a:miter lim="800000"/>
+                <a:headEnd/>
+                <a:tailEnd/>
+              </a14:hiddenLine>
+            </a:ext>
+          </a:extLst>
+        </p:spPr>
+      </p:pic>
+      <p:pic>
+        <p:nvPicPr>
+          <p:cNvPr id="5" name="Picture 2"/>
+          <p:cNvPicPr>
+            <a:picLocks noChangeAspect="1" noChangeArrowheads="1"/>
+          </p:cNvPicPr>
+          <p:nvPr/>
+        </p:nvPicPr>
+        <p:blipFill rotWithShape="1">
+          <a:blip r:embed="rId3" cstate="print">
+            <a:extLst>
+              <a:ext uri="{28A0092B-C50C-407E-A947-70E740481C1C}">
+                <a14:useLocalDpi xmlns:a14="http://schemas.microsoft.com/office/drawing/2010/main" val="0"/>
+              </a:ext>
+            </a:extLst>
+          </a:blip>
+          <a:srcRect l="8600" t="10500" r="4629" b="7595"/>
+          <a:stretch/>
+        </p:blipFill>
+        <p:spPr bwMode="auto">
+          <a:xfrm>
+            <a:off x="251520" y="1770043"/>
+            <a:ext cx="4806345" cy="2451045"/>
+          </a:xfrm>
+          <a:prstGeom prst="rect">
+            <a:avLst/>
+          </a:prstGeom>
+          <a:noFill/>
+          <a:ln>
+            <a:noFill/>
+          </a:ln>
+          <a:extLst>
+            <a:ext uri="{909E8E84-426E-40DD-AFC4-6F175D3DCCD1}">
+              <a14:hiddenFill xmlns:a14="http://schemas.microsoft.com/office/drawing/2010/main">
+                <a:solidFill>
+                  <a:schemeClr val="accent1"/>
+                </a:solidFill>
+              </a14:hiddenFill>
+            </a:ext>
+            <a:ext uri="{91240B29-F687-4F45-9708-019B960494DF}">
+              <a14:hiddenLine xmlns:a14="http://schemas.microsoft.com/office/drawing/2010/main" w="9525">
+                <a:solidFill>
+                  <a:schemeClr val="tx1"/>
+                </a:solidFill>
+                <a:miter lim="800000"/>
+                <a:headEnd/>
+                <a:tailEnd/>
+              </a14:hiddenLine>
+            </a:ext>
+          </a:extLst>
+        </p:spPr>
+      </p:pic>
+      <p:pic>
+        <p:nvPicPr>
+          <p:cNvPr id="4099" name="Picture 3"/>
+          <p:cNvPicPr>
+            <a:picLocks noChangeAspect="1" noChangeArrowheads="1"/>
+          </p:cNvPicPr>
+          <p:nvPr/>
+        </p:nvPicPr>
+        <p:blipFill rotWithShape="1">
+          <a:blip r:embed="rId4">
+            <a:extLst>
+              <a:ext uri="{28A0092B-C50C-407E-A947-70E740481C1C}">
+                <a14:useLocalDpi xmlns:a14="http://schemas.microsoft.com/office/drawing/2010/main" val="0"/>
+              </a:ext>
+            </a:extLst>
+          </a:blip>
+          <a:srcRect l="3438" t="22612" r="6464" b="10065"/>
+          <a:stretch/>
+        </p:blipFill>
+        <p:spPr bwMode="auto">
+          <a:xfrm>
+            <a:off x="5148063" y="4221088"/>
+            <a:ext cx="3250533" cy="2160240"/>
+          </a:xfrm>
+          <a:prstGeom prst="rect">
+            <a:avLst/>
+          </a:prstGeom>
+          <a:noFill/>
+          <a:ln>
+            <a:noFill/>
+          </a:ln>
+          <a:extLst>
+            <a:ext uri="{909E8E84-426E-40DD-AFC4-6F175D3DCCD1}">
+              <a14:hiddenFill xmlns:a14="http://schemas.microsoft.com/office/drawing/2010/main">
+                <a:solidFill>
+                  <a:schemeClr val="accent1"/>
+                </a:solidFill>
+              </a14:hiddenFill>
+            </a:ext>
+            <a:ext uri="{91240B29-F687-4F45-9708-019B960494DF}">
+              <a14:hiddenLine xmlns:a14="http://schemas.microsoft.com/office/drawing/2010/main" w="9525">
+                <a:solidFill>
+                  <a:schemeClr val="tx1"/>
+                </a:solidFill>
+                <a:miter lim="800000"/>
+                <a:headEnd/>
+                <a:tailEnd/>
+              </a14:hiddenLine>
+            </a:ext>
+          </a:extLst>
+        </p:spPr>
+      </p:pic>
+      <p:sp>
+        <p:nvSpPr>
+          <p:cNvPr id="7" name="TextBox 6"/>
+          <p:cNvSpPr txBox="1"/>
+          <p:nvPr/>
+        </p:nvSpPr>
+        <p:spPr>
+          <a:xfrm>
+            <a:off x="179512" y="4221088"/>
+            <a:ext cx="5040560" cy="2062103"/>
+          </a:xfrm>
+          <a:prstGeom prst="rect">
+            <a:avLst/>
+          </a:prstGeom>
+          <a:noFill/>
+        </p:spPr>
+        <p:txBody>
+          <a:bodyPr wrap="square" rtlCol="0">
+            <a:spAutoFit/>
+          </a:bodyPr>
+          <a:lstStyle/>
+          <a:p>
+            <a:r>
+              <a:rPr lang="en-US" sz="1600" dirty="0" smtClean="0"/>
+              <a:t>We observe the following:</a:t>
+            </a:r>
+          </a:p>
+          <a:p>
+            <a:r>
+              <a:rPr lang="en-US" sz="1600" dirty="0" smtClean="0"/>
+              <a:t>- The </a:t>
+            </a:r>
+            <a:r>
+              <a:rPr lang="en-US" sz="1600" b="1" dirty="0" smtClean="0">
+                <a:sym typeface="Symbol"/>
+              </a:rPr>
+              <a:t> structure tends to ~ 0.1</a:t>
+            </a:r>
+            <a:r>
+              <a:rPr lang="en-US" sz="1600" dirty="0" smtClean="0">
+                <a:sym typeface="Symbol"/>
+              </a:rPr>
+              <a:t>, which is the value of ().</a:t>
+            </a:r>
+          </a:p>
+          <a:p>
+            <a:r>
+              <a:rPr lang="en-US" sz="1600" dirty="0" smtClean="0"/>
+              <a:t>- Although the </a:t>
+            </a:r>
+            <a:r>
+              <a:rPr lang="en-US" sz="1600" dirty="0" smtClean="0">
+                <a:sym typeface="Symbol"/>
+              </a:rPr>
+              <a:t></a:t>
+            </a:r>
+            <a:r>
+              <a:rPr lang="en-US" sz="1600" dirty="0" smtClean="0"/>
+              <a:t> structure is </a:t>
+            </a:r>
+            <a:r>
+              <a:rPr lang="en-US" sz="1600" i="1" dirty="0" smtClean="0"/>
+              <a:t>not </a:t>
+            </a:r>
+            <a:r>
+              <a:rPr lang="en-US" sz="1600" dirty="0" smtClean="0"/>
+              <a:t>noisy, the </a:t>
+            </a:r>
+            <a:r>
+              <a:rPr lang="en-US" sz="1600" b="1" dirty="0" smtClean="0"/>
+              <a:t>convergence to the true value function is slower </a:t>
+            </a:r>
+            <a:r>
+              <a:rPr lang="en-US" sz="1600" dirty="0" smtClean="0"/>
+              <a:t>than in the other two cases presented earlier.</a:t>
+            </a:r>
+          </a:p>
+          <a:p>
+            <a:r>
+              <a:rPr lang="en-US" sz="1600" dirty="0" smtClean="0"/>
+              <a:t>- Contrary to the other two cases, </a:t>
+            </a:r>
+            <a:r>
+              <a:rPr lang="en-US" sz="1600" b="1" dirty="0" smtClean="0"/>
+              <a:t>the values of </a:t>
+            </a:r>
+            <a:r>
+              <a:rPr lang="en-US" sz="1600" b="1" dirty="0" smtClean="0">
+                <a:sym typeface="Symbol"/>
+              </a:rPr>
+              <a:t> don’t “jump immediately” to the limit value</a:t>
+            </a:r>
+            <a:r>
+              <a:rPr lang="en-US" sz="1600" dirty="0" smtClean="0">
+                <a:sym typeface="Symbol"/>
+              </a:rPr>
+              <a:t>, but tends to it more slowly.</a:t>
+            </a:r>
+            <a:endParaRPr lang="en-US" sz="1600" dirty="0" smtClean="0"/>
+          </a:p>
+        </p:txBody>
+      </p:sp>
+      <p:sp>
+        <p:nvSpPr>
+          <p:cNvPr id="8" name="TextBox 7"/>
+          <p:cNvSpPr txBox="1"/>
+          <p:nvPr/>
+        </p:nvSpPr>
+        <p:spPr>
+          <a:xfrm>
+            <a:off x="1203056" y="1393031"/>
+            <a:ext cx="2792880" cy="307777"/>
+          </a:xfrm>
+          <a:prstGeom prst="rect">
+            <a:avLst/>
+          </a:prstGeom>
+          <a:noFill/>
+        </p:spPr>
+        <p:txBody>
+          <a:bodyPr wrap="none" rtlCol="0">
+            <a:spAutoFit/>
+          </a:bodyPr>
+          <a:lstStyle/>
+          <a:p>
+            <a:pPr algn="ctr"/>
+            <a:r>
+              <a:rPr lang="en-US" sz="1400" b="1" dirty="0" smtClean="0"/>
+              <a:t>Distribution of </a:t>
+            </a:r>
+            <a:r>
+              <a:rPr lang="en-US" sz="1400" b="1" dirty="0" smtClean="0">
+                <a:sym typeface="Symbol"/>
+              </a:rPr>
+              <a:t> by state </a:t>
+            </a:r>
+            <a:r>
+              <a:rPr lang="en-US" sz="1400" b="1" smtClean="0">
+                <a:sym typeface="Symbol"/>
+              </a:rPr>
+              <a:t>over time</a:t>
+            </a:r>
+            <a:endParaRPr lang="en-US" sz="1400" b="1" dirty="0"/>
+          </a:p>
+        </p:txBody>
+      </p:sp>
+      <p:sp>
+        <p:nvSpPr>
+          <p:cNvPr id="9" name="TextBox 8"/>
+          <p:cNvSpPr txBox="1"/>
+          <p:nvPr/>
+        </p:nvSpPr>
+        <p:spPr>
+          <a:xfrm>
+            <a:off x="5039050" y="1393031"/>
+            <a:ext cx="3637406" cy="307777"/>
+          </a:xfrm>
+          <a:prstGeom prst="rect">
+            <a:avLst/>
+          </a:prstGeom>
+          <a:noFill/>
+        </p:spPr>
+        <p:txBody>
+          <a:bodyPr wrap="none" rtlCol="0">
+            <a:spAutoFit/>
+          </a:bodyPr>
+          <a:lstStyle/>
+          <a:p>
+            <a:pPr algn="ctr"/>
+            <a:r>
+              <a:rPr lang="en-US" sz="1400" b="1" dirty="0" smtClean="0"/>
+              <a:t>Convergence speed and average </a:t>
+            </a:r>
+            <a:r>
+              <a:rPr lang="en-US" sz="1400" b="1" dirty="0" smtClean="0">
+                <a:sym typeface="Symbol"/>
+              </a:rPr>
+              <a:t> by episode</a:t>
+            </a:r>
+            <a:endParaRPr lang="en-US" sz="1400" b="1" dirty="0"/>
+          </a:p>
+        </p:txBody>
+      </p:sp>
+    </p:spTree>
+    <p:extLst>
+      <p:ext uri="{BB962C8B-B14F-4D97-AF65-F5344CB8AC3E}">
+        <p14:creationId xmlns:p14="http://schemas.microsoft.com/office/powerpoint/2010/main" val="4276076860"/>
+      </p:ext>
+    </p:extLst>
+  </p:cSld>
+  <p:clrMapOvr>
+    <a:masterClrMapping/>
+  </p:clrMapOvr>
+</p:sld>
+</file>
+
+<file path=ppt/slides/slide27.xml><?xml version="1.0" encoding="utf-8"?>
+<p:sld xmlns:a="http://schemas.openxmlformats.org/drawingml/2006/main" xmlns:r="http://schemas.openxmlformats.org/officeDocument/2006/relationships" xmlns:p="http://schemas.openxmlformats.org/presentationml/2006/main">
+  <p:cSld>
+    <p:spTree>
+      <p:nvGrpSpPr>
+        <p:cNvPr id="1" name=""/>
+        <p:cNvGrpSpPr/>
+        <p:nvPr/>
+      </p:nvGrpSpPr>
+      <p:grpSpPr>
+        <a:xfrm>
+          <a:off x="0" y="0"/>
+          <a:ext cx="0" cy="0"/>
+          <a:chOff x="0" y="0"/>
+          <a:chExt cx="0" cy="0"/>
+        </a:xfrm>
+      </p:grpSpPr>
+      <p:sp>
+        <p:nvSpPr>
+          <p:cNvPr id="2" name="Title 1"/>
+          <p:cNvSpPr>
+            <a:spLocks noGrp="1"/>
+          </p:cNvSpPr>
+          <p:nvPr>
+            <p:ph type="ctrTitle"/>
+          </p:nvPr>
+        </p:nvSpPr>
+        <p:spPr/>
+        <p:txBody>
+          <a:bodyPr/>
+          <a:lstStyle/>
+          <a:p>
+            <a:r>
+              <a:rPr lang="en-US" dirty="0" smtClean="0">
+                <a:sym typeface="Symbol"/>
+              </a:rPr>
+              <a:t>DRAFT</a:t>
+            </a:r>
+            <a:endParaRPr lang="en-US" dirty="0"/>
+          </a:p>
+        </p:txBody>
+      </p:sp>
+      <p:sp>
+        <p:nvSpPr>
+          <p:cNvPr id="3" name="Subtitle 2"/>
+          <p:cNvSpPr>
+            <a:spLocks noGrp="1"/>
+          </p:cNvSpPr>
+          <p:nvPr>
+            <p:ph type="subTitle" idx="1"/>
+          </p:nvPr>
+        </p:nvSpPr>
+        <p:spPr/>
+        <p:txBody>
+          <a:bodyPr/>
+          <a:lstStyle/>
+          <a:p>
+            <a:endParaRPr lang="en-US" dirty="0"/>
+          </a:p>
+        </p:txBody>
+      </p:sp>
+      <p:sp>
+        <p:nvSpPr>
+          <p:cNvPr id="4" name="Slide Number Placeholder 3"/>
+          <p:cNvSpPr>
+            <a:spLocks noGrp="1"/>
+          </p:cNvSpPr>
+          <p:nvPr>
+            <p:ph type="sldNum" sz="quarter" idx="12"/>
+          </p:nvPr>
+        </p:nvSpPr>
+        <p:spPr/>
+        <p:txBody>
+          <a:bodyPr/>
+          <a:lstStyle/>
+          <a:p>
+            <a:fld id="{62D96F91-737B-4795-86FD-3CFC620DA94D}" type="slidenum">
+              <a:rPr lang="en-US" smtClean="0"/>
+              <a:t>27</a:t>
+            </a:fld>
+            <a:endParaRPr lang="en-US"/>
+          </a:p>
+        </p:txBody>
+      </p:sp>
+    </p:spTree>
+    <p:extLst>
+      <p:ext uri="{BB962C8B-B14F-4D97-AF65-F5344CB8AC3E}">
+        <p14:creationId xmlns:p14="http://schemas.microsoft.com/office/powerpoint/2010/main" val="2280354320"/>
+      </p:ext>
+    </p:extLst>
+  </p:cSld>
+  <p:clrMapOvr>
+    <a:masterClrMapping/>
+  </p:clrMapOvr>
+  <p:timing>
+    <p:tnLst>
+      <p:par>
+        <p:cTn id="1" dur="indefinite" restart="never" nodeType="tmRoot"/>
+      </p:par>
+    </p:tnLst>
+  </p:timing>
+</p:sld>
+</file>
+
+<file path=ppt/slides/slide28.xml><?xml version="1.0" encoding="utf-8"?>
+<p:sld xmlns:a="http://schemas.openxmlformats.org/drawingml/2006/main" xmlns:r="http://schemas.openxmlformats.org/officeDocument/2006/relationships" xmlns:p="http://schemas.openxmlformats.org/presentationml/2006/main">
+  <p:cSld>
+    <p:spTree>
+      <p:nvGrpSpPr>
+        <p:cNvPr id="1" name=""/>
+        <p:cNvGrpSpPr/>
+        <p:nvPr/>
+      </p:nvGrpSpPr>
+      <p:grpSpPr>
+        <a:xfrm>
+          <a:off x="0" y="0"/>
+          <a:ext cx="0" cy="0"/>
+          <a:chOff x="0" y="0"/>
+          <a:chExt cx="0" cy="0"/>
+        </a:xfrm>
+      </p:grpSpPr>
+      <p:sp>
+        <p:nvSpPr>
+          <p:cNvPr id="2" name="Title 1"/>
+          <p:cNvSpPr>
+            <a:spLocks noGrp="1"/>
+          </p:cNvSpPr>
+          <p:nvPr>
+            <p:ph type="title"/>
+          </p:nvPr>
+        </p:nvSpPr>
+        <p:spPr/>
+        <p:txBody>
+          <a:bodyPr>
+            <a:normAutofit fontScale="90000"/>
+          </a:bodyPr>
+          <a:lstStyle/>
+          <a:p>
+            <a:r>
+              <a:rPr lang="en-US" dirty="0" smtClean="0"/>
+              <a:t>Adaptive TD(</a:t>
+            </a:r>
+            <a:r>
+              <a:rPr lang="en-US" dirty="0" smtClean="0">
+                <a:sym typeface="Symbol"/>
+              </a:rPr>
+              <a:t>) -  distribution</a:t>
+            </a:r>
+            <a:br>
+              <a:rPr lang="en-US" dirty="0" smtClean="0">
+                <a:sym typeface="Symbol"/>
+              </a:rPr>
+            </a:br>
+            <a:r>
+              <a:rPr lang="en-US" sz="3100" dirty="0" smtClean="0">
+                <a:sym typeface="Symbol"/>
+              </a:rPr>
+              <a:t>Three ways of adjusting  as a function of (t)</a:t>
+            </a:r>
+            <a:endParaRPr lang="en-US" sz="3100" dirty="0"/>
+          </a:p>
+        </p:txBody>
+      </p:sp>
+      <p:sp>
+        <p:nvSpPr>
+          <p:cNvPr id="4" name="Slide Number Placeholder 3"/>
+          <p:cNvSpPr>
+            <a:spLocks noGrp="1"/>
+          </p:cNvSpPr>
+          <p:nvPr>
+            <p:ph type="sldNum" sz="quarter" idx="12"/>
+          </p:nvPr>
+        </p:nvSpPr>
+        <p:spPr/>
+        <p:txBody>
+          <a:bodyPr/>
+          <a:lstStyle/>
+          <a:p>
+            <a:fld id="{62D96F91-737B-4795-86FD-3CFC620DA94D}" type="slidenum">
+              <a:rPr lang="en-US" smtClean="0"/>
+              <a:t>28</a:t>
             </a:fld>
             <a:endParaRPr lang="en-US"/>
           </a:p>
@@ -7635,19 +9577,7 @@
             </a:r>
             <a:r>
               <a:rPr lang="en-US" sz="1400" b="1" dirty="0" smtClean="0"/>
-              <a:t>| </a:t>
-            </a:r>
-            <a:r>
-              <a:rPr lang="en-US" sz="1400" b="1" dirty="0" smtClean="0"/>
-              <a:t>/ </a:t>
-            </a:r>
-            <a:r>
-              <a:rPr lang="en-US" sz="1400" b="1" dirty="0" smtClean="0"/>
-              <a:t>|V(S(t)) </a:t>
-            </a:r>
-            <a:r>
-              <a:rPr lang="en-US" sz="1400" b="1" dirty="0" smtClean="0"/>
-              <a:t>|</a:t>
+              <a:t>| / |V(S(t)) |</a:t>
             </a:r>
             <a:endParaRPr lang="en-US" sz="1400" b="1" dirty="0"/>
           </a:p>
@@ -7678,7 +9608,15 @@
             <a:pPr algn="ctr"/>
             <a:r>
               <a:rPr lang="en-US" sz="1400" b="1" dirty="0" smtClean="0"/>
-              <a:t>Relative, but avoiding division by 0</a:t>
+              <a:t>Relative, </a:t>
+            </a:r>
+            <a:r>
+              <a:rPr lang="en-US" sz="1400" b="1" i="1" dirty="0" smtClean="0"/>
+              <a:t>but avoiding division by 0</a:t>
+            </a:r>
+            <a:r>
+              <a:rPr lang="en-US" sz="1400" b="1" dirty="0" smtClean="0"/>
+              <a:t/>
             </a:r>
             <a:br>
               <a:rPr lang="en-US" sz="1400" b="1" dirty="0" smtClean="0"/>
@@ -7693,33 +9631,17 @@
             </a:r>
             <a:r>
               <a:rPr lang="en-US" sz="1400" b="1" dirty="0" smtClean="0"/>
-              <a:t>( </a:t>
+              <a:t>( |</a:t>
+            </a:r>
+            <a:r>
+              <a:rPr lang="en-US" sz="1400" b="1" dirty="0" smtClean="0">
+                <a:sym typeface="Symbol"/>
+              </a:rPr>
+              <a:t>(t)</a:t>
             </a:r>
             <a:r>
               <a:rPr lang="en-US" sz="1400" b="1" dirty="0" smtClean="0"/>
-              <a:t>|</a:t>
-            </a:r>
-            <a:r>
-              <a:rPr lang="en-US" sz="1400" b="1" dirty="0" smtClean="0">
-                <a:sym typeface="Symbol"/>
-              </a:rPr>
-              <a:t>(t)</a:t>
-            </a:r>
-            <a:r>
-              <a:rPr lang="en-US" sz="1400" b="1" dirty="0" smtClean="0"/>
-              <a:t>| </a:t>
-            </a:r>
-            <a:r>
-              <a:rPr lang="en-US" sz="1400" b="1" dirty="0" smtClean="0"/>
-              <a:t>- </a:t>
-            </a:r>
-            <a:r>
-              <a:rPr lang="en-US" sz="1400" b="1" dirty="0" smtClean="0"/>
-              <a:t>|V(S(t)| </a:t>
-            </a:r>
-            <a:r>
-              <a:rPr lang="en-US" sz="1400" b="1" dirty="0" smtClean="0"/>
-              <a:t>)</a:t>
+              <a:t>| - |V(S(t)| )</a:t>
             </a:r>
             <a:endParaRPr lang="en-US" sz="1400" b="1" dirty="0"/>
           </a:p>
@@ -7776,7 +9698,503 @@
     </p:spTree>
     <p:extLst>
       <p:ext uri="{BB962C8B-B14F-4D97-AF65-F5344CB8AC3E}">
-        <p14:creationId xmlns:p14="http://schemas.microsoft.com/office/powerpoint/2010/main" val="3053468085"/>
+        <p14:creationId xmlns:p14="http://schemas.microsoft.com/office/powerpoint/2010/main" val="1009876166"/>
+      </p:ext>
+    </p:extLst>
+  </p:cSld>
+  <p:clrMapOvr>
+    <a:masterClrMapping/>
+  </p:clrMapOvr>
+  <p:timing>
+    <p:tnLst>
+      <p:par>
+        <p:cTn id="1" dur="indefinite" restart="never" nodeType="tmRoot"/>
+      </p:par>
+    </p:tnLst>
+  </p:timing>
+</p:sld>
+</file>
+
+<file path=ppt/slides/slide29.xml><?xml version="1.0" encoding="utf-8"?>
+<p:sld xmlns:a="http://schemas.openxmlformats.org/drawingml/2006/main" xmlns:r="http://schemas.openxmlformats.org/officeDocument/2006/relationships" xmlns:p="http://schemas.openxmlformats.org/presentationml/2006/main">
+  <p:cSld>
+    <p:spTree>
+      <p:nvGrpSpPr>
+        <p:cNvPr id="1" name=""/>
+        <p:cNvGrpSpPr/>
+        <p:nvPr/>
+      </p:nvGrpSpPr>
+      <p:grpSpPr>
+        <a:xfrm>
+          <a:off x="0" y="0"/>
+          <a:ext cx="0" cy="0"/>
+          <a:chOff x="0" y="0"/>
+          <a:chExt cx="0" cy="0"/>
+        </a:xfrm>
+      </p:grpSpPr>
+      <p:sp>
+        <p:nvSpPr>
+          <p:cNvPr id="2" name="Title 1"/>
+          <p:cNvSpPr>
+            <a:spLocks noGrp="1"/>
+          </p:cNvSpPr>
+          <p:nvPr>
+            <p:ph type="title"/>
+          </p:nvPr>
+        </p:nvSpPr>
+        <p:spPr/>
+        <p:txBody>
+          <a:bodyPr>
+            <a:normAutofit fontScale="90000"/>
+          </a:bodyPr>
+          <a:lstStyle/>
+          <a:p>
+            <a:r>
+              <a:rPr lang="en-US" dirty="0" smtClean="0">
+                <a:sym typeface="Symbol"/>
+              </a:rPr>
+              <a:t> adjusted ~ </a:t>
+            </a:r>
+            <a:r>
+              <a:rPr lang="en-US" dirty="0" err="1" smtClean="0"/>
+              <a:t>exp</a:t>
+            </a:r>
+            <a:r>
+              <a:rPr lang="en-US" dirty="0" smtClean="0"/>
+              <a:t>( |</a:t>
+            </a:r>
+            <a:r>
+              <a:rPr lang="en-US" dirty="0">
+                <a:sym typeface="Symbol"/>
+              </a:rPr>
+              <a:t>(t)</a:t>
+            </a:r>
+            <a:r>
+              <a:rPr lang="en-US" dirty="0"/>
+              <a:t>| - |V(S(t)| </a:t>
+            </a:r>
+            <a:r>
+              <a:rPr lang="en-US" dirty="0" smtClean="0"/>
+              <a:t>)</a:t>
+            </a:r>
+            <a:br>
+              <a:rPr lang="en-US" dirty="0" smtClean="0"/>
+            </a:br>
+            <a:r>
+              <a:rPr lang="en-US" sz="2700" dirty="0" smtClean="0">
+                <a:sym typeface="Symbol"/>
+              </a:rPr>
+              <a:t>Formula: </a:t>
+            </a:r>
+            <a:r>
+              <a:rPr lang="en-US" sz="2700" dirty="0">
+                <a:sym typeface="Symbol"/>
+              </a:rPr>
+              <a:t></a:t>
+            </a:r>
+            <a:r>
+              <a:rPr lang="en-US" sz="2700" dirty="0" smtClean="0">
+                <a:sym typeface="Symbol"/>
+              </a:rPr>
+              <a:t>(t) = 1 – </a:t>
+            </a:r>
+            <a:r>
+              <a:rPr lang="en-US" sz="2700" dirty="0" err="1" smtClean="0">
+                <a:sym typeface="Symbol"/>
+              </a:rPr>
+              <a:t>exp</a:t>
+            </a:r>
+            <a:r>
+              <a:rPr lang="en-US" sz="2700" dirty="0" smtClean="0">
+                <a:sym typeface="Symbol"/>
+              </a:rPr>
+              <a:t>(-</a:t>
+            </a:r>
+            <a:r>
+              <a:rPr lang="en-US" sz="2700" dirty="0" err="1" smtClean="0">
+                <a:sym typeface="Symbol"/>
+              </a:rPr>
+              <a:t>exp</a:t>
+            </a:r>
+            <a:r>
+              <a:rPr lang="en-US" sz="2700" dirty="0" smtClean="0">
+                <a:sym typeface="Symbol"/>
+              </a:rPr>
+              <a:t>(</a:t>
+            </a:r>
+            <a:r>
+              <a:rPr lang="en-US" sz="2700" dirty="0"/>
+              <a:t>|</a:t>
+            </a:r>
+            <a:r>
+              <a:rPr lang="en-US" sz="2700" dirty="0">
+                <a:sym typeface="Symbol"/>
+              </a:rPr>
+              <a:t>(t)</a:t>
+            </a:r>
+            <a:r>
+              <a:rPr lang="en-US" sz="2700" dirty="0"/>
+              <a:t>| - |V(S(t</a:t>
+            </a:r>
+            <a:r>
+              <a:rPr lang="en-US" sz="2700" dirty="0" smtClean="0"/>
+              <a:t>)|))</a:t>
+            </a:r>
+            <a:endParaRPr lang="en-US" dirty="0"/>
+          </a:p>
+        </p:txBody>
+      </p:sp>
+      <p:sp>
+        <p:nvSpPr>
+          <p:cNvPr id="3" name="Slide Number Placeholder 2"/>
+          <p:cNvSpPr>
+            <a:spLocks noGrp="1"/>
+          </p:cNvSpPr>
+          <p:nvPr>
+            <p:ph type="sldNum" sz="quarter" idx="12"/>
+          </p:nvPr>
+        </p:nvSpPr>
+        <p:spPr/>
+        <p:txBody>
+          <a:bodyPr/>
+          <a:lstStyle/>
+          <a:p>
+            <a:fld id="{62D96F91-737B-4795-86FD-3CFC620DA94D}" type="slidenum">
+              <a:rPr lang="en-US" smtClean="0"/>
+              <a:t>29</a:t>
+            </a:fld>
+            <a:endParaRPr lang="en-US"/>
+          </a:p>
+        </p:txBody>
+      </p:sp>
+      <p:pic>
+        <p:nvPicPr>
+          <p:cNvPr id="5122" name="Picture 2"/>
+          <p:cNvPicPr>
+            <a:picLocks noChangeAspect="1" noChangeArrowheads="1"/>
+          </p:cNvPicPr>
+          <p:nvPr/>
+        </p:nvPicPr>
+        <p:blipFill rotWithShape="1">
+          <a:blip r:embed="rId2" cstate="print">
+            <a:extLst>
+              <a:ext uri="{28A0092B-C50C-407E-A947-70E740481C1C}">
+                <a14:useLocalDpi xmlns:a14="http://schemas.microsoft.com/office/drawing/2010/main" val="0"/>
+              </a:ext>
+            </a:extLst>
+          </a:blip>
+          <a:srcRect l="8368" t="14451" r="5315" b="9228"/>
+          <a:stretch/>
+        </p:blipFill>
+        <p:spPr bwMode="auto">
+          <a:xfrm>
+            <a:off x="35496" y="4864766"/>
+            <a:ext cx="3590664" cy="1876602"/>
+          </a:xfrm>
+          <a:prstGeom prst="rect">
+            <a:avLst/>
+          </a:prstGeom>
+          <a:noFill/>
+          <a:ln>
+            <a:noFill/>
+          </a:ln>
+          <a:extLst>
+            <a:ext uri="{909E8E84-426E-40DD-AFC4-6F175D3DCCD1}">
+              <a14:hiddenFill xmlns:a14="http://schemas.microsoft.com/office/drawing/2010/main">
+                <a:solidFill>
+                  <a:schemeClr val="accent1"/>
+                </a:solidFill>
+              </a14:hiddenFill>
+            </a:ext>
+            <a:ext uri="{91240B29-F687-4F45-9708-019B960494DF}">
+              <a14:hiddenLine xmlns:a14="http://schemas.microsoft.com/office/drawing/2010/main" w="9525">
+                <a:solidFill>
+                  <a:schemeClr val="tx1"/>
+                </a:solidFill>
+                <a:miter lim="800000"/>
+                <a:headEnd/>
+                <a:tailEnd/>
+              </a14:hiddenLine>
+            </a:ext>
+          </a:extLst>
+        </p:spPr>
+      </p:pic>
+      <p:pic>
+        <p:nvPicPr>
+          <p:cNvPr id="5123" name="Picture 3"/>
+          <p:cNvPicPr>
+            <a:picLocks noChangeAspect="1" noChangeArrowheads="1"/>
+          </p:cNvPicPr>
+          <p:nvPr/>
+        </p:nvPicPr>
+        <p:blipFill rotWithShape="1">
+          <a:blip r:embed="rId3">
+            <a:extLst>
+              <a:ext uri="{28A0092B-C50C-407E-A947-70E740481C1C}">
+                <a14:useLocalDpi xmlns:a14="http://schemas.microsoft.com/office/drawing/2010/main" val="0"/>
+              </a:ext>
+            </a:extLst>
+          </a:blip>
+          <a:srcRect l="3422" t="22418" r="6694" b="8694"/>
+          <a:stretch/>
+        </p:blipFill>
+        <p:spPr bwMode="auto">
+          <a:xfrm>
+            <a:off x="6540466" y="4839180"/>
+            <a:ext cx="2424022" cy="1944216"/>
+          </a:xfrm>
+          <a:prstGeom prst="rect">
+            <a:avLst/>
+          </a:prstGeom>
+          <a:noFill/>
+          <a:ln>
+            <a:noFill/>
+          </a:ln>
+          <a:extLst>
+            <a:ext uri="{909E8E84-426E-40DD-AFC4-6F175D3DCCD1}">
+              <a14:hiddenFill xmlns:a14="http://schemas.microsoft.com/office/drawing/2010/main">
+                <a:solidFill>
+                  <a:schemeClr val="accent1"/>
+                </a:solidFill>
+              </a14:hiddenFill>
+            </a:ext>
+            <a:ext uri="{91240B29-F687-4F45-9708-019B960494DF}">
+              <a14:hiddenLine xmlns:a14="http://schemas.microsoft.com/office/drawing/2010/main" w="9525">
+                <a:solidFill>
+                  <a:schemeClr val="tx1"/>
+                </a:solidFill>
+                <a:miter lim="800000"/>
+                <a:headEnd/>
+                <a:tailEnd/>
+              </a14:hiddenLine>
+            </a:ext>
+          </a:extLst>
+        </p:spPr>
+      </p:pic>
+      <p:pic>
+        <p:nvPicPr>
+          <p:cNvPr id="5124" name="Picture 4"/>
+          <p:cNvPicPr>
+            <a:picLocks noChangeAspect="1" noChangeArrowheads="1"/>
+          </p:cNvPicPr>
+          <p:nvPr/>
+        </p:nvPicPr>
+        <p:blipFill rotWithShape="1">
+          <a:blip r:embed="rId4">
+            <a:extLst>
+              <a:ext uri="{28A0092B-C50C-407E-A947-70E740481C1C}">
+                <a14:useLocalDpi xmlns:a14="http://schemas.microsoft.com/office/drawing/2010/main" val="0"/>
+              </a:ext>
+            </a:extLst>
+          </a:blip>
+          <a:srcRect l="2591" t="22860" b="4556"/>
+          <a:stretch/>
+        </p:blipFill>
+        <p:spPr bwMode="auto">
+          <a:xfrm>
+            <a:off x="3684636" y="4864766"/>
+            <a:ext cx="2831580" cy="2020618"/>
+          </a:xfrm>
+          <a:prstGeom prst="rect">
+            <a:avLst/>
+          </a:prstGeom>
+          <a:noFill/>
+          <a:ln>
+            <a:noFill/>
+          </a:ln>
+          <a:extLst>
+            <a:ext uri="{909E8E84-426E-40DD-AFC4-6F175D3DCCD1}">
+              <a14:hiddenFill xmlns:a14="http://schemas.microsoft.com/office/drawing/2010/main">
+                <a:solidFill>
+                  <a:schemeClr val="accent1"/>
+                </a:solidFill>
+              </a14:hiddenFill>
+            </a:ext>
+            <a:ext uri="{91240B29-F687-4F45-9708-019B960494DF}">
+              <a14:hiddenLine xmlns:a14="http://schemas.microsoft.com/office/drawing/2010/main" w="9525">
+                <a:solidFill>
+                  <a:schemeClr val="tx1"/>
+                </a:solidFill>
+                <a:miter lim="800000"/>
+                <a:headEnd/>
+                <a:tailEnd/>
+              </a14:hiddenLine>
+            </a:ext>
+          </a:extLst>
+        </p:spPr>
+      </p:pic>
+      <p:sp>
+        <p:nvSpPr>
+          <p:cNvPr id="4" name="TextBox 3"/>
+          <p:cNvSpPr txBox="1"/>
+          <p:nvPr/>
+        </p:nvSpPr>
+        <p:spPr>
+          <a:xfrm>
+            <a:off x="467544" y="1412776"/>
+            <a:ext cx="8284384" cy="3600986"/>
+          </a:xfrm>
+          <a:prstGeom prst="rect">
+            <a:avLst/>
+          </a:prstGeom>
+          <a:noFill/>
+        </p:spPr>
+        <p:txBody>
+          <a:bodyPr wrap="square" rtlCol="0">
+            <a:spAutoFit/>
+          </a:bodyPr>
+          <a:lstStyle/>
+          <a:p>
+            <a:r>
+              <a:rPr lang="en-US" dirty="0" smtClean="0"/>
+              <a:t>The goal of using this </a:t>
+            </a:r>
+            <a:r>
+              <a:rPr lang="en-US" i="1" dirty="0" smtClean="0"/>
+              <a:t>calculation as an indication of the “relative change of </a:t>
+            </a:r>
+            <a:r>
+              <a:rPr lang="en-US" i="1" dirty="0" smtClean="0">
+                <a:sym typeface="Symbol"/>
+              </a:rPr>
+              <a:t>(t)”</a:t>
+            </a:r>
+            <a:r>
+              <a:rPr lang="en-US" dirty="0" smtClean="0">
+                <a:sym typeface="Symbol"/>
+              </a:rPr>
+              <a:t> is to avoid division by 0 or by a very small value (e.g. for states near the middle of the grid).</a:t>
+            </a:r>
+          </a:p>
+          <a:p>
+            <a:endParaRPr lang="en-US" dirty="0">
+              <a:sym typeface="Symbol"/>
+            </a:endParaRPr>
+          </a:p>
+          <a:p>
+            <a:r>
+              <a:rPr lang="en-US" dirty="0" smtClean="0">
+                <a:sym typeface="Symbol"/>
+              </a:rPr>
+              <a:t>This option however has two drawbacks:</a:t>
+            </a:r>
+          </a:p>
+          <a:p>
+            <a:pPr marL="285750" indent="-285750">
+              <a:buFont typeface="Arial" panose="020B0604020202020204" pitchFamily="34" charset="0"/>
+              <a:buChar char="•"/>
+            </a:pPr>
+            <a:r>
+              <a:rPr lang="en-US" dirty="0" smtClean="0">
+                <a:sym typeface="Symbol"/>
+              </a:rPr>
+              <a:t> never reaches 0. Its minimum is around 0.4 (in fact, in order for  to reach a very small value, V(S(t)) should be much larger than (t) in absolute value, and in the “worst” case we could have |(t)| - |V(S(t))| ~= 0 - 1  = -1, for which  = 0.3 (still far from 0…))</a:t>
+            </a:r>
+          </a:p>
+          <a:p>
+            <a:pPr marL="285750" indent="-285750">
+              <a:buFont typeface="Arial" panose="020B0604020202020204" pitchFamily="34" charset="0"/>
+              <a:buChar char="•"/>
+            </a:pPr>
+            <a:r>
+              <a:rPr lang="en-US" dirty="0" smtClean="0">
+                <a:sym typeface="Symbol"/>
+              </a:rPr>
+              <a:t>The limit for is still “noisy”, as is the case with the relative (t) adjustment (</a:t>
+            </a:r>
+            <a:r>
+              <a:rPr lang="en-US" b="1" dirty="0" smtClean="0">
+                <a:solidFill>
+                  <a:srgbClr val="C00000"/>
+                </a:solidFill>
+                <a:sym typeface="Symbol"/>
+              </a:rPr>
+              <a:t>red law</a:t>
+            </a:r>
+            <a:r>
+              <a:rPr lang="en-US" dirty="0" smtClean="0">
+                <a:sym typeface="Symbol"/>
+              </a:rPr>
+              <a:t>).</a:t>
+            </a:r>
+          </a:p>
+          <a:p>
+            <a:r>
+              <a:rPr lang="en-US" sz="1400" i="1" dirty="0" smtClean="0">
+                <a:sym typeface="Symbol"/>
+              </a:rPr>
+              <a:t>Note that the limit for  should oscillate between 1 – </a:t>
+            </a:r>
+            <a:r>
+              <a:rPr lang="en-US" sz="1400" i="1" dirty="0" err="1" smtClean="0">
+                <a:sym typeface="Symbol"/>
+              </a:rPr>
+              <a:t>exp</a:t>
+            </a:r>
+            <a:r>
+              <a:rPr lang="en-US" sz="1400" i="1" dirty="0" smtClean="0">
+                <a:sym typeface="Symbol"/>
+              </a:rPr>
+              <a:t>(-</a:t>
+            </a:r>
+            <a:r>
+              <a:rPr lang="en-US" sz="1400" i="1" dirty="0" err="1" smtClean="0">
+                <a:sym typeface="Symbol"/>
+              </a:rPr>
+              <a:t>exp</a:t>
+            </a:r>
+            <a:r>
+              <a:rPr lang="en-US" sz="1400" i="1" dirty="0" smtClean="0">
+                <a:sym typeface="Symbol"/>
+              </a:rPr>
+              <a:t>(0.1 - 0.0)) and 1 – </a:t>
+            </a:r>
+            <a:r>
+              <a:rPr lang="en-US" sz="1400" i="1" dirty="0" err="1" smtClean="0">
+                <a:sym typeface="Symbol"/>
+              </a:rPr>
+              <a:t>exp</a:t>
+            </a:r>
+            <a:r>
+              <a:rPr lang="en-US" sz="1400" i="1" dirty="0" smtClean="0">
+                <a:sym typeface="Symbol"/>
+              </a:rPr>
+              <a:t>(-</a:t>
+            </a:r>
+            <a:r>
+              <a:rPr lang="en-US" sz="1400" i="1" dirty="0" err="1" smtClean="0">
+                <a:sym typeface="Symbol"/>
+              </a:rPr>
+              <a:t>exp</a:t>
+            </a:r>
+            <a:r>
+              <a:rPr lang="en-US" sz="1400" i="1" dirty="0" smtClean="0">
+                <a:sym typeface="Symbol"/>
+              </a:rPr>
+              <a:t>(0.1 – 0.9), i.e. between 0.67 and 0.36. The oscillation in the plot below is smaller than this range because we are plotting the </a:t>
+            </a:r>
+            <a:r>
+              <a:rPr lang="en-US" sz="1400" b="1" i="1" dirty="0" smtClean="0">
+                <a:sym typeface="Symbol"/>
+              </a:rPr>
+              <a:t>average</a:t>
+            </a:r>
+            <a:r>
+              <a:rPr lang="en-US" sz="1400" i="1" dirty="0" smtClean="0">
+                <a:sym typeface="Symbol"/>
+              </a:rPr>
+              <a:t>  over all states visited in the episode.</a:t>
+            </a:r>
+            <a:endParaRPr lang="en-US" sz="1400" i="1" dirty="0">
+              <a:sym typeface="Symbol"/>
+            </a:endParaRPr>
+          </a:p>
+        </p:txBody>
+      </p:sp>
+    </p:spTree>
+    <p:extLst>
+      <p:ext uri="{BB962C8B-B14F-4D97-AF65-F5344CB8AC3E}">
+        <p14:creationId xmlns:p14="http://schemas.microsoft.com/office/powerpoint/2010/main" val="1995525013"/>
       </p:ext>
     </p:extLst>
   </p:cSld>
@@ -7835,25 +10253,7 @@
               <a:rPr lang="en-US" sz="3600" dirty="0" smtClean="0">
                 <a:sym typeface="Symbol"/>
               </a:rPr>
-              <a:t> </a:t>
-            </a:r>
-            <a:r>
-              <a:rPr lang="en-US" sz="3600" dirty="0" smtClean="0">
-                <a:sym typeface="Symbol"/>
-              </a:rPr>
-              <a:t>adjusted by </a:t>
-            </a:r>
-            <a:r>
-              <a:rPr lang="en-US" sz="3600" dirty="0" smtClean="0">
-                <a:sym typeface="Symbol"/>
-              </a:rPr>
-              <a:t>state c</a:t>
-            </a:r>
-            <a:r>
-              <a:rPr lang="en-US" sz="3600" dirty="0" smtClean="0">
-                <a:sym typeface="Symbol"/>
-              </a:rPr>
-              <a:t>ount;</a:t>
+              <a:t> adjusted by state count;</a:t>
             </a:r>
             <a:r>
               <a:rPr lang="en-US" sz="3600" dirty="0">
@@ -7996,11 +10396,7 @@
             </a:r>
             <a:r>
               <a:rPr lang="en-US" sz="3600" dirty="0" smtClean="0"/>
-              <a:t>adjust </a:t>
-            </a:r>
-            <a:r>
-              <a:rPr lang="en-US" sz="3600" dirty="0" smtClean="0"/>
-              <a:t>by first-visit State Count</a:t>
+              <a:t>adjust by first-visit State Count</a:t>
             </a:r>
             <a:r>
               <a:rPr lang="en-US" sz="3600" dirty="0"/>
@@ -8241,11 +10637,7 @@
             </a:r>
             <a:r>
               <a:rPr lang="en-US" sz="3600" dirty="0" smtClean="0"/>
-              <a:t>adjust </a:t>
-            </a:r>
-            <a:r>
-              <a:rPr lang="en-US" sz="3600" dirty="0" smtClean="0"/>
-              <a:t>by State Count</a:t>
+              <a:t>adjust by State Count</a:t>
             </a:r>
             <a:br>
               <a:rPr lang="en-US" sz="3600" dirty="0" smtClean="0"/>
@@ -8408,13 +10800,7 @@
               <a:rPr lang="en-US" sz="1400" i="1" dirty="0" smtClean="0">
                 <a:sym typeface="Symbol"/>
               </a:rPr>
-              <a:t> = </a:t>
-            </a:r>
-            <a:r>
-              <a:rPr lang="en-US" sz="1400" i="1" dirty="0" smtClean="0">
-                <a:sym typeface="Symbol"/>
-              </a:rPr>
-              <a:t>2</a:t>
+              <a:t> = 2</a:t>
             </a:r>
             <a:endParaRPr lang="en-US" sz="1400" i="1" dirty="0"/>
           </a:p>
@@ -8716,13 +11102,7 @@
               <a:rPr lang="en-US" sz="3600" dirty="0" smtClean="0">
                 <a:sym typeface="Symbol"/>
               </a:rPr>
-              <a:t> </a:t>
-            </a:r>
-            <a:r>
-              <a:rPr lang="en-US" sz="3600" dirty="0" smtClean="0">
-                <a:sym typeface="Symbol"/>
-              </a:rPr>
-              <a:t>adjusted by </a:t>
+              <a:t> adjusted by </a:t>
             </a:r>
             <a:r>
               <a:rPr lang="en-US" sz="3600" dirty="0">
@@ -8867,31 +11247,23 @@
           <a:p>
             <a:r>
               <a:rPr lang="en-US" sz="3600" dirty="0" smtClean="0"/>
-              <a:t>First-visit MC</a:t>
+              <a:t>First-visit MC,</a:t>
+            </a:r>
+            <a:r>
+              <a:rPr lang="en-US" sz="3600" dirty="0">
+                <a:sym typeface="Symbol"/>
+              </a:rPr>
+              <a:t> </a:t>
+            </a:r>
+            <a:r>
+              <a:rPr lang="en-US" sz="3600" dirty="0" smtClean="0">
+                <a:sym typeface="Symbol"/>
+              </a:rPr>
+              <a:t>-</a:t>
             </a:r>
             <a:r>
               <a:rPr lang="en-US" sz="3600" dirty="0" smtClean="0"/>
-              <a:t>,</a:t>
-            </a:r>
-            <a:r>
-              <a:rPr lang="en-US" sz="3600" dirty="0">
-                <a:sym typeface="Symbol"/>
-              </a:rPr>
-              <a:t> </a:t>
-            </a:r>
-            <a:r>
-              <a:rPr lang="en-US" sz="3600" dirty="0" smtClean="0">
-                <a:sym typeface="Symbol"/>
-              </a:rPr>
-              <a:t>-</a:t>
-            </a:r>
-            <a:r>
-              <a:rPr lang="en-US" sz="3600" dirty="0" smtClean="0"/>
-              <a:t>adjust </a:t>
-            </a:r>
-            <a:r>
-              <a:rPr lang="en-US" sz="3600" dirty="0" smtClean="0"/>
-              <a:t>by Episode</a:t>
+              <a:t>adjust by Episode</a:t>
             </a:r>
             <a:br>
               <a:rPr lang="en-US" sz="3600" dirty="0" smtClean="0"/>
@@ -9136,11 +11508,7 @@
             </a:r>
             <a:r>
               <a:rPr lang="en-US" sz="3600" dirty="0" smtClean="0"/>
-              <a:t>djust </a:t>
-            </a:r>
-            <a:r>
-              <a:rPr lang="en-US" sz="3600" dirty="0" smtClean="0"/>
-              <a:t>by Episode</a:t>
+              <a:t>djust by Episode</a:t>
             </a:r>
             <a:br>
               <a:rPr lang="en-US" sz="3600" dirty="0" smtClean="0"/>

</xml_diff>